<commit_message>
Small update to the presentation and the commands text.
</commit_message>
<xml_diff>
--- a/Securely Access Secrets within Azure Key Vault.pptx
+++ b/Securely Access Secrets within Azure Key Vault.pptx
@@ -253,7 +253,7 @@
           <a:p>
             <a:fld id="{7FD8C188-00C6-46F1-8CED-F01BD31E4433}" type="datetimeFigureOut">
               <a:rPr lang="de-DE" smtClean="0"/>
-              <a:t>14.03.2018</a:t>
+              <a:t>21.03.2018</a:t>
             </a:fld>
             <a:endParaRPr lang="de-DE" dirty="0"/>
           </a:p>
@@ -419,7 +419,7 @@
           <a:p>
             <a:fld id="{7DF1D401-158B-4B2B-A98D-403A2BA6A3BF}" type="datetimeFigureOut">
               <a:rPr lang="de-DE" smtClean="0"/>
-              <a:t>14.03.2018</a:t>
+              <a:t>21.03.2018</a:t>
             </a:fld>
             <a:endParaRPr lang="de-DE" dirty="0"/>
           </a:p>
@@ -738,15 +738,20 @@
             </a:r>
             <a:r>
               <a:rPr lang="en-US" baseline="0" dirty="0" smtClean="0"/>
-              <a:t> </a:t>
-            </a:r>
+              <a:t> evening guys,</a:t>
+            </a:r>
+          </a:p>
+          <a:p>
+            <a:endParaRPr lang="en-US" baseline="0" dirty="0" smtClean="0"/>
+          </a:p>
+          <a:p>
             <a:r>
               <a:rPr lang="en-US" baseline="0" dirty="0" smtClean="0"/>
-              <a:t>evening </a:t>
+              <a:t>Thank you for joining this session. Tonight, I am going to talk about </a:t>
             </a:r>
             <a:r>
               <a:rPr lang="en-US" baseline="0" dirty="0" smtClean="0"/>
-              <a:t>guys,</a:t>
+              <a:t>secrets and Azure Key Vault.</a:t>
             </a:r>
           </a:p>
           <a:p>
@@ -755,21 +760,8 @@
           <a:p>
             <a:r>
               <a:rPr lang="en-US" baseline="0" dirty="0" smtClean="0"/>
-              <a:t>Thank you for joining this session</a:t>
-            </a:r>
-            <a:r>
-              <a:rPr lang="en-US" baseline="0" dirty="0" smtClean="0"/>
-              <a:t>. Tonight, </a:t>
-            </a:r>
-            <a:r>
-              <a:rPr lang="en-US" baseline="0" dirty="0" smtClean="0"/>
-              <a:t>I am going to talk about how to retrieve your secrets securely within Azure Key Vault</a:t>
-            </a:r>
-            <a:r>
-              <a:rPr lang="en-US" baseline="0" dirty="0" smtClean="0"/>
-              <a:t>.</a:t>
-            </a:r>
-            <a:endParaRPr lang="en-US" baseline="0" dirty="0" smtClean="0"/>
+              <a:t>Because my demo is quite long, I will just go through the slide quickly. Please let me know if you want me to repeat some particular slide.</a:t>
+            </a:r>
           </a:p>
         </p:txBody>
       </p:sp>
@@ -859,7 +851,15 @@
             </a:pPr>
             <a:r>
               <a:rPr lang="en-US" baseline="0" dirty="0" smtClean="0"/>
-              <a:t>Luckily again, Azure provides us with a way to inject a certificate to Azure VM when the VM is provisioned. I will demonstrate on how we can do it.</a:t>
+              <a:t>Luckily again, Azure provides us with a way to inject a certificate to Azure VM when </a:t>
+            </a:r>
+            <a:r>
+              <a:rPr lang="en-US" baseline="0" dirty="0" smtClean="0"/>
+              <a:t>it’s </a:t>
+            </a:r>
+            <a:r>
+              <a:rPr lang="en-US" baseline="0" dirty="0" smtClean="0"/>
+              <a:t>provisioned. I will demonstrate on how we can do it.</a:t>
             </a:r>
           </a:p>
           <a:p>
@@ -1896,7 +1896,79 @@
             </a:r>
             <a:r>
               <a:rPr lang="de-DE" baseline="0" dirty="0" smtClean="0"/>
-              <a:t> Service Identity. So </a:t>
+              <a:t> Service </a:t>
+            </a:r>
+            <a:r>
+              <a:rPr lang="de-DE" baseline="0" dirty="0" smtClean="0"/>
+              <a:t>Identity </a:t>
+            </a:r>
+            <a:r>
+              <a:rPr lang="de-DE" baseline="0" dirty="0" err="1" smtClean="0"/>
+              <a:t>which</a:t>
+            </a:r>
+            <a:r>
+              <a:rPr lang="de-DE" baseline="0" dirty="0" smtClean="0"/>
+              <a:t> </a:t>
+            </a:r>
+            <a:r>
+              <a:rPr lang="de-DE" baseline="0" dirty="0" err="1" smtClean="0"/>
+              <a:t>is</a:t>
+            </a:r>
+            <a:r>
+              <a:rPr lang="de-DE" baseline="0" dirty="0" smtClean="0"/>
+              <a:t> </a:t>
+            </a:r>
+            <a:r>
+              <a:rPr lang="de-DE" baseline="0" dirty="0" err="1" smtClean="0"/>
+              <a:t>another</a:t>
+            </a:r>
+            <a:r>
+              <a:rPr lang="de-DE" baseline="0" dirty="0" smtClean="0"/>
+              <a:t> </a:t>
+            </a:r>
+            <a:r>
+              <a:rPr lang="de-DE" baseline="0" dirty="0" err="1" smtClean="0"/>
+              <a:t>way</a:t>
+            </a:r>
+            <a:r>
+              <a:rPr lang="de-DE" baseline="0" dirty="0" smtClean="0"/>
+              <a:t> </a:t>
+            </a:r>
+            <a:r>
+              <a:rPr lang="de-DE" baseline="0" dirty="0" err="1" smtClean="0"/>
+              <a:t>to</a:t>
+            </a:r>
+            <a:r>
+              <a:rPr lang="de-DE" baseline="0" dirty="0" smtClean="0"/>
+              <a:t> </a:t>
+            </a:r>
+            <a:r>
+              <a:rPr lang="de-DE" baseline="0" dirty="0" err="1" smtClean="0"/>
+              <a:t>solve</a:t>
+            </a:r>
+            <a:r>
+              <a:rPr lang="de-DE" baseline="0" dirty="0" smtClean="0"/>
+              <a:t> </a:t>
+            </a:r>
+            <a:r>
+              <a:rPr lang="de-DE" baseline="0" dirty="0" err="1" smtClean="0"/>
+              <a:t>the</a:t>
+            </a:r>
+            <a:r>
+              <a:rPr lang="de-DE" baseline="0" dirty="0" smtClean="0"/>
+              <a:t> </a:t>
+            </a:r>
+            <a:r>
+              <a:rPr lang="de-DE" baseline="0" dirty="0" err="1" smtClean="0"/>
+              <a:t>problem</a:t>
+            </a:r>
+            <a:r>
+              <a:rPr lang="de-DE" baseline="0" dirty="0" smtClean="0"/>
+              <a:t>. </a:t>
+            </a:r>
+            <a:r>
+              <a:rPr lang="de-DE" baseline="0" dirty="0" smtClean="0"/>
+              <a:t>So </a:t>
             </a:r>
             <a:r>
               <a:rPr lang="de-DE" baseline="0" dirty="0" err="1" smtClean="0"/>
@@ -2012,25 +2084,29 @@
             </a:r>
             <a:r>
               <a:rPr lang="en-US" baseline="0" dirty="0" smtClean="0"/>
-              <a:t> are so many ways on how you can build your apps.</a:t>
-            </a:r>
-          </a:p>
-          <a:p>
+              <a:t> are so many ways on how you can </a:t>
+            </a:r>
             <a:r>
               <a:rPr lang="en-US" baseline="0" dirty="0" smtClean="0"/>
-              <a:t>You can build your apps </a:t>
+              <a:t>run </a:t>
             </a:r>
             <a:r>
               <a:rPr lang="en-US" baseline="0" dirty="0" smtClean="0"/>
-              <a:t>running in virtual machines </a:t>
-            </a:r>
+              <a:t>your apps.</a:t>
+            </a:r>
+          </a:p>
+          <a:p>
             <a:r>
               <a:rPr lang="en-US" baseline="0" dirty="0" smtClean="0"/>
-              <a:t>or you can host it in </a:t>
+              <a:t>You can </a:t>
             </a:r>
             <a:r>
               <a:rPr lang="en-US" baseline="0" dirty="0" smtClean="0"/>
-              <a:t>PaaS.</a:t>
+              <a:t>run in </a:t>
+            </a:r>
+            <a:r>
+              <a:rPr lang="en-US" baseline="0" dirty="0" smtClean="0"/>
+              <a:t>virtual machines or you can host it in PaaS.</a:t>
             </a:r>
           </a:p>
           <a:p>
@@ -2039,26 +2115,13 @@
           <a:p>
             <a:r>
               <a:rPr lang="en-US" baseline="0" dirty="0" smtClean="0"/>
-              <a:t>Regardless of how you build your apps, You can always find a common challenge, which is Secrets</a:t>
-            </a:r>
+              <a:t>Regardless of how you build your apps, You can always find a common challenge, which is Secrets!</a:t>
+            </a:r>
+          </a:p>
+          <a:p>
             <a:r>
               <a:rPr lang="en-US" baseline="0" dirty="0" smtClean="0"/>
-              <a:t>!</a:t>
-            </a:r>
-            <a:endParaRPr lang="en-US" baseline="0" dirty="0" smtClean="0"/>
-          </a:p>
-          <a:p>
-            <a:r>
-              <a:rPr lang="en-US" baseline="0" dirty="0" smtClean="0"/>
-              <a:t>Things like connection strings to your database, </a:t>
-            </a:r>
-            <a:r>
-              <a:rPr lang="en-US" baseline="0" dirty="0" smtClean="0"/>
-              <a:t>passwords, </a:t>
-            </a:r>
-            <a:r>
-              <a:rPr lang="en-US" baseline="0" dirty="0" smtClean="0"/>
-              <a:t>encryption keys, or anything which is not supposed to be acquired without proper permissions.</a:t>
+              <a:t>Things like connection strings to your database, passwords, encryption keys, or anything which is not supposed to be acquired without proper permissions.</a:t>
             </a:r>
           </a:p>
           <a:p>
@@ -2268,15 +2331,7 @@
           <a:p>
             <a:r>
               <a:rPr lang="en-US" dirty="0" smtClean="0"/>
-              <a:t>The other reason </a:t>
-            </a:r>
-            <a:r>
-              <a:rPr lang="en-US" dirty="0" smtClean="0"/>
-              <a:t>is </a:t>
-            </a:r>
-            <a:r>
-              <a:rPr lang="en-US" dirty="0" smtClean="0"/>
-              <a:t>our own silly mistakes.</a:t>
+              <a:t>The other reason is our own silly mistakes.</a:t>
             </a:r>
           </a:p>
           <a:p>
@@ -2286,15 +2341,7 @@
             </a:r>
             <a:r>
               <a:rPr lang="en-US" baseline="0" dirty="0" smtClean="0"/>
-              <a:t> any engineers who works with these secrets are human after all, and </a:t>
-            </a:r>
-            <a:r>
-              <a:rPr lang="en-US" baseline="0" dirty="0" smtClean="0"/>
-              <a:t>human makes </a:t>
-            </a:r>
-            <a:r>
-              <a:rPr lang="en-US" baseline="0" dirty="0" smtClean="0"/>
-              <a:t>mistakes.</a:t>
+              <a:t> any engineers who works with these secrets are human after all, and human makes mistakes.</a:t>
             </a:r>
           </a:p>
           <a:p>
@@ -2307,15 +2354,7 @@
             </a:r>
             <a:r>
               <a:rPr lang="en-US" baseline="0" dirty="0" smtClean="0"/>
-              <a:t> </a:t>
-            </a:r>
-            <a:r>
-              <a:rPr lang="en-US" baseline="0" dirty="0" smtClean="0"/>
-              <a:t>couple </a:t>
-            </a:r>
-            <a:r>
-              <a:rPr lang="en-US" baseline="0" dirty="0" smtClean="0"/>
-              <a:t>of data breaches are caused by human mistakes and these mistakes can cost companies a lot of money.</a:t>
+              <a:t> couple of data breaches are caused by human mistakes and these mistakes can cost companies a lot of money.</a:t>
             </a:r>
           </a:p>
           <a:p>
@@ -2323,14 +2362,37 @@
               <a:rPr lang="en-US" baseline="0" dirty="0" smtClean="0"/>
               <a:t>One of the common mistakes is putting the secrets publicly accessible. </a:t>
             </a:r>
-          </a:p>
-          <a:p>
             <a:endParaRPr lang="en-US" baseline="0" dirty="0" smtClean="0"/>
           </a:p>
           <a:p>
+            <a:endParaRPr lang="en-US" baseline="0" dirty="0" smtClean="0"/>
+          </a:p>
+          <a:p>
             <a:r>
               <a:rPr lang="en-US" baseline="0" dirty="0" smtClean="0"/>
-              <a:t>We are going to take a look at one tool that can help us in storing secret in Microsoft Azure.</a:t>
+              <a:t>Here is one example of public key publicly accessible on </a:t>
+            </a:r>
+            <a:r>
+              <a:rPr lang="en-US" baseline="0" dirty="0" err="1" smtClean="0"/>
+              <a:t>github</a:t>
+            </a:r>
+            <a:r>
+              <a:rPr lang="en-US" baseline="0" dirty="0" smtClean="0"/>
+              <a:t>.</a:t>
+            </a:r>
+            <a:endParaRPr lang="en-US" baseline="0" dirty="0" smtClean="0"/>
+          </a:p>
+          <a:p>
+            <a:endParaRPr lang="en-US" baseline="0" dirty="0" smtClean="0"/>
+          </a:p>
+          <a:p>
+            <a:r>
+              <a:rPr lang="en-US" baseline="0" dirty="0" smtClean="0"/>
+              <a:t>Anyway, we </a:t>
+            </a:r>
+            <a:r>
+              <a:rPr lang="en-US" baseline="0" dirty="0" smtClean="0"/>
+              <a:t>are going to take a look at one tool that can help us in storing secret in Microsoft Azure.</a:t>
             </a:r>
           </a:p>
         </p:txBody>
@@ -2417,7 +2479,25 @@
           <a:p>
             <a:r>
               <a:rPr lang="en-US" baseline="0" dirty="0" smtClean="0"/>
-              <a:t>Azure Key Vault is a Managed Service that could help you store your secrets safely in Microsoft Azure. Think of it as a Secret Store as a Service.</a:t>
+              <a:t>Azure Key Vault is a Managed Service that could help you store your secrets safely in Microsoft Azure. </a:t>
+            </a:r>
+            <a:r>
+              <a:rPr lang="en-US" baseline="0" dirty="0" smtClean="0"/>
+              <a:t>Just to make it simple, think </a:t>
+            </a:r>
+            <a:r>
+              <a:rPr lang="en-US" baseline="0" dirty="0" smtClean="0"/>
+              <a:t>of it as a Secret Store as a Service</a:t>
+            </a:r>
+            <a:r>
+              <a:rPr lang="en-US" baseline="0" dirty="0" smtClean="0"/>
+              <a:t>. All you have to do is just pay and use </a:t>
+            </a:r>
+            <a:r>
+              <a:rPr lang="en-US" baseline="0" dirty="0" smtClean="0">
+                <a:sym typeface="Wingdings" panose="05000000000000000000" pitchFamily="2" charset="2"/>
+              </a:rPr>
+              <a:t></a:t>
             </a:r>
             <a:endParaRPr lang="en-US" baseline="0" dirty="0" smtClean="0"/>
           </a:p>
@@ -2511,7 +2591,26 @@
           <a:p>
             <a:r>
               <a:rPr lang="en-US" baseline="0" dirty="0" smtClean="0"/>
-              <a:t>And Azure Key Vault also have authorization in place with their access policies.</a:t>
+              <a:t>And Azure Key Vault also have authorization in place with their access policies</a:t>
+            </a:r>
+            <a:r>
+              <a:rPr lang="en-US" baseline="0" dirty="0" smtClean="0"/>
+              <a:t>.</a:t>
+            </a:r>
+          </a:p>
+          <a:p>
+            <a:endParaRPr lang="en-US" baseline="0" dirty="0" smtClean="0"/>
+          </a:p>
+          <a:p>
+            <a:r>
+              <a:rPr lang="en-US" baseline="0" dirty="0" smtClean="0"/>
+              <a:t>So in this diagram, the application have to authenticate and get the access token, and then it can use the access token to make a request azure key vault.</a:t>
+            </a:r>
+          </a:p>
+          <a:p>
+            <a:r>
+              <a:rPr lang="en-US" baseline="0" dirty="0" smtClean="0"/>
+              <a:t>If the application identity is allowed in this policy, then it will be able to access it, otherwise no.</a:t>
             </a:r>
             <a:endParaRPr lang="en-US" dirty="0"/>
           </a:p>
@@ -2603,7 +2702,15 @@
             </a:r>
             <a:r>
               <a:rPr lang="en-US" baseline="0" dirty="0" smtClean="0"/>
-              <a:t> the authentication is between machine-to-machine, the application must submit a credential to Azure Active Directory.</a:t>
+              <a:t> the authentication is between </a:t>
+            </a:r>
+            <a:r>
+              <a:rPr lang="en-US" baseline="0" dirty="0" smtClean="0"/>
+              <a:t>machine-to-machine and it has to be automated, </a:t>
+            </a:r>
+            <a:r>
+              <a:rPr lang="en-US" baseline="0" dirty="0" smtClean="0"/>
+              <a:t>the application must submit a credential to Azure Active Directory.</a:t>
             </a:r>
           </a:p>
           <a:p>
@@ -2625,7 +2732,11 @@
             </a:r>
             <a:r>
               <a:rPr lang="en-US" baseline="0" dirty="0" smtClean="0"/>
-              <a:t> which is stored in the application configuration.</a:t>
+              <a:t> and just store it in the </a:t>
+            </a:r>
+            <a:r>
+              <a:rPr lang="en-US" baseline="0" dirty="0" smtClean="0"/>
+              <a:t>application configuration.</a:t>
             </a:r>
           </a:p>
           <a:p>
@@ -2756,7 +2867,23 @@
             </a:r>
             <a:r>
               <a:rPr lang="en-US" baseline="0" dirty="0" smtClean="0"/>
-              <a:t> is no longer needed, but rather the applications now authenticate by proving that it own the private key for the certificate.</a:t>
+              <a:t> is no longer needed, but </a:t>
+            </a:r>
+            <a:r>
+              <a:rPr lang="en-US" baseline="0" dirty="0" smtClean="0"/>
+              <a:t>the </a:t>
+            </a:r>
+            <a:r>
+              <a:rPr lang="en-US" baseline="0" dirty="0" smtClean="0"/>
+              <a:t>applications now authenticate by proving that it </a:t>
+            </a:r>
+            <a:r>
+              <a:rPr lang="en-US" baseline="0" dirty="0" smtClean="0"/>
+              <a:t>owns </a:t>
+            </a:r>
+            <a:r>
+              <a:rPr lang="en-US" baseline="0" dirty="0" smtClean="0"/>
+              <a:t>the private key for the certificate.</a:t>
             </a:r>
           </a:p>
           <a:p>
@@ -3192,7 +3319,7 @@
           <a:p>
             <a:fld id="{A38F0158-E2E4-4D2D-A4F7-E6CCBAFA81D6}" type="datetime1">
               <a:rPr lang="en-US" smtClean="0"/>
-              <a:t>3/14/2018</a:t>
+              <a:t>3/21/2018</a:t>
             </a:fld>
             <a:endParaRPr lang="de-DE" dirty="0"/>
           </a:p>
@@ -3456,7 +3583,7 @@
           <a:p>
             <a:fld id="{59C3A03E-14AE-490D-B524-B4741AFF6D13}" type="datetime1">
               <a:rPr lang="en-US" smtClean="0"/>
-              <a:t>3/14/2018</a:t>
+              <a:t>3/21/2018</a:t>
             </a:fld>
             <a:endParaRPr lang="de-DE" dirty="0"/>
           </a:p>
@@ -3613,7 +3740,7 @@
           <a:p>
             <a:fld id="{451E5513-53A5-4C48-B41C-E858FA1DC886}" type="datetime1">
               <a:rPr lang="en-US" smtClean="0"/>
-              <a:t>3/14/2018</a:t>
+              <a:t>3/21/2018</a:t>
             </a:fld>
             <a:endParaRPr lang="de-DE" dirty="0"/>
           </a:p>
@@ -3793,7 +3920,7 @@
           <a:p>
             <a:fld id="{D01AA0F1-88BA-403A-AE2A-CDBAA5B83798}" type="datetime1">
               <a:rPr lang="en-US" smtClean="0"/>
-              <a:t>3/14/2018</a:t>
+              <a:t>3/21/2018</a:t>
             </a:fld>
             <a:endParaRPr lang="de-DE" dirty="0"/>
           </a:p>
@@ -4173,7 +4300,7 @@
           <a:p>
             <a:fld id="{E8CF11EF-5002-4A19-B8CC-5EED5B9EAABF}" type="datetime1">
               <a:rPr lang="en-US" smtClean="0"/>
-              <a:t>3/14/2018</a:t>
+              <a:t>3/21/2018</a:t>
             </a:fld>
             <a:endParaRPr lang="de-DE" dirty="0"/>
           </a:p>
@@ -4348,7 +4475,7 @@
           <a:p>
             <a:fld id="{8838DC5F-BE50-418E-B541-A41F452E432A}" type="datetime1">
               <a:rPr lang="en-US" smtClean="0"/>
-              <a:t>3/14/2018</a:t>
+              <a:t>3/21/2018</a:t>
             </a:fld>
             <a:endParaRPr lang="de-DE" dirty="0"/>
           </a:p>
@@ -4605,7 +4732,7 @@
           <a:p>
             <a:fld id="{1C5B3543-A8FC-4920-82B6-FAE8F92687F5}" type="datetime1">
               <a:rPr lang="en-US" smtClean="0"/>
-              <a:t>3/14/2018</a:t>
+              <a:t>3/21/2018</a:t>
             </a:fld>
             <a:endParaRPr lang="de-DE" dirty="0"/>
           </a:p>
@@ -4987,7 +5114,7 @@
           <a:p>
             <a:fld id="{475005D0-C357-4CFA-8922-F62F412C7D0C}" type="datetime1">
               <a:rPr lang="en-US" smtClean="0"/>
-              <a:t>3/14/2018</a:t>
+              <a:t>3/21/2018</a:t>
             </a:fld>
             <a:endParaRPr lang="de-DE" dirty="0"/>
           </a:p>
@@ -5167,7 +5294,7 @@
           <a:p>
             <a:fld id="{00A42ED9-D46B-4488-B455-43A0EE289A66}" type="datetime1">
               <a:rPr lang="en-US" smtClean="0"/>
-              <a:t>3/14/2018</a:t>
+              <a:t>3/21/2018</a:t>
             </a:fld>
             <a:endParaRPr lang="de-DE" dirty="0"/>
           </a:p>
@@ -6072,7 +6199,7 @@
           <a:p>
             <a:fld id="{A04BD714-3DEB-4980-AFD1-B0C1363009F0}" type="datetime1">
               <a:rPr lang="en-US" smtClean="0"/>
-              <a:t>3/14/2018</a:t>
+              <a:t>3/21/2018</a:t>
             </a:fld>
             <a:endParaRPr lang="de-DE" dirty="0"/>
           </a:p>
@@ -6455,7 +6582,7 @@
           <a:p>
             <a:fld id="{E7D000D3-187C-4F7C-A251-E8D86A7D1FA4}" type="datetime1">
               <a:rPr lang="en-US" smtClean="0"/>
-              <a:t>3/14/2018</a:t>
+              <a:t>3/21/2018</a:t>
             </a:fld>
             <a:endParaRPr lang="de-DE" dirty="0"/>
           </a:p>
@@ -6614,7 +6741,7 @@
           <a:p>
             <a:fld id="{AAF1E470-B823-4DEB-AD46-E311EEA61E9C}" type="datetime1">
               <a:rPr lang="en-US" smtClean="0"/>
-              <a:t>3/14/2018</a:t>
+              <a:t>3/21/2018</a:t>
             </a:fld>
             <a:endParaRPr lang="de-DE" dirty="0"/>
           </a:p>
@@ -6926,7 +7053,7 @@
           <a:p>
             <a:fld id="{ED8419EB-A28A-4A26-9B63-32A4E2833A02}" type="datetime1">
               <a:rPr lang="en-US" smtClean="0"/>
-              <a:t>3/14/2018</a:t>
+              <a:t>3/21/2018</a:t>
             </a:fld>
             <a:endParaRPr lang="de-DE" dirty="0"/>
           </a:p>
@@ -7577,19 +7704,11 @@
           <a:p>
             <a:r>
               <a:rPr lang="en-US" dirty="0" smtClean="0"/>
-              <a:t>Overcoming chicken-egg problem while accessing secrets </a:t>
+              <a:t>Overcoming the </a:t>
             </a:r>
             <a:r>
               <a:rPr lang="en-US" dirty="0" smtClean="0"/>
-              <a:t>from</a:t>
-            </a:r>
-            <a:r>
-              <a:rPr lang="en-US" dirty="0" smtClean="0"/>
-              <a:t> </a:t>
-            </a:r>
-            <a:r>
-              <a:rPr lang="en-US" dirty="0" smtClean="0"/>
-              <a:t>Azure VM</a:t>
+              <a:t>chicken-egg problem while accessing secrets from Azure VM</a:t>
             </a:r>
             <a:endParaRPr lang="en-US" noProof="0" dirty="0"/>
           </a:p>
@@ -7685,7 +7804,7 @@
           <a:p>
             <a:fld id="{8838DC5F-BE50-418E-B541-A41F452E432A}" type="datetime1">
               <a:rPr lang="en-US" smtClean="0"/>
-              <a:t>3/14/2018</a:t>
+              <a:t>3/21/2018</a:t>
             </a:fld>
             <a:endParaRPr lang="de-DE" dirty="0"/>
           </a:p>
@@ -7713,11 +7832,7 @@
           <a:p>
             <a:r>
               <a:rPr lang="en-US" noProof="0" dirty="0" smtClean="0"/>
-              <a:t>Demo – ARM VM </a:t>
-            </a:r>
-            <a:r>
-              <a:rPr lang="en-US" noProof="0" dirty="0" smtClean="0"/>
-              <a:t>Client Certificate Injection</a:t>
+              <a:t>Demo – ARM VM Client Certificate Injection</a:t>
             </a:r>
             <a:endParaRPr lang="en-US" noProof="0" dirty="0"/>
           </a:p>
@@ -8177,13 +8292,8 @@
               </a:pPr>
               <a:r>
                 <a:rPr lang="en-US" sz="2000" dirty="0" smtClean="0"/>
-                <a:t>Azure </a:t>
+                <a:t>Azure Key Vault</a:t>
               </a:r>
-              <a:r>
-                <a:rPr lang="en-US" sz="2000" dirty="0" smtClean="0"/>
-                <a:t>Key Vault</a:t>
-              </a:r>
-              <a:endParaRPr lang="en-US" sz="2000" dirty="0" smtClean="0"/>
             </a:p>
           </p:txBody>
         </p:sp>
@@ -8270,7 +8380,6 @@
                 <a:rPr lang="en-US" sz="2000" dirty="0" smtClean="0"/>
                 <a:t>Register</a:t>
               </a:r>
-              <a:endParaRPr lang="en-US" sz="2000" dirty="0" smtClean="0"/>
             </a:p>
           </p:txBody>
         </p:sp>
@@ -8357,7 +8466,6 @@
                 <a:rPr lang="en-US" sz="2000" dirty="0" smtClean="0"/>
                 <a:t>Upload Cert</a:t>
               </a:r>
-              <a:endParaRPr lang="en-US" sz="2000" dirty="0" smtClean="0"/>
             </a:p>
           </p:txBody>
         </p:sp>
@@ -8406,7 +8514,6 @@
               <a:rPr lang="en-US" sz="1200" dirty="0" smtClean="0"/>
               <a:t>Service Principal</a:t>
             </a:r>
-            <a:endParaRPr lang="en-US" sz="1200" dirty="0" smtClean="0"/>
           </a:p>
         </p:txBody>
       </p:sp>
@@ -8454,7 +8561,6 @@
               <a:rPr lang="en-US" sz="1200" dirty="0" smtClean="0"/>
               <a:t>Private Cert</a:t>
             </a:r>
-            <a:endParaRPr lang="en-US" sz="1200" dirty="0" smtClean="0"/>
           </a:p>
         </p:txBody>
       </p:sp>
@@ -8502,7 +8608,6 @@
               <a:rPr lang="en-US" sz="1200" dirty="0" smtClean="0"/>
               <a:t>ARM Template</a:t>
             </a:r>
-            <a:endParaRPr lang="en-US" sz="1200" dirty="0" smtClean="0"/>
           </a:p>
         </p:txBody>
       </p:sp>
@@ -8597,7 +8702,6 @@
                 <a:rPr lang="en-US" sz="2000" dirty="0" smtClean="0"/>
                 <a:t>Manager</a:t>
               </a:r>
-              <a:endParaRPr lang="en-US" sz="2000" dirty="0" smtClean="0"/>
             </a:p>
           </p:txBody>
         </p:sp>
@@ -8684,7 +8788,6 @@
                 <a:rPr lang="en-US" sz="2000" dirty="0" smtClean="0"/>
                 <a:t>Deploy</a:t>
               </a:r>
-              <a:endParaRPr lang="en-US" sz="2000" dirty="0" smtClean="0"/>
             </a:p>
           </p:txBody>
         </p:sp>
@@ -8816,7 +8919,6 @@
                   <a:rPr lang="en-US" sz="2000" dirty="0" smtClean="0"/>
                   <a:t>Azure VM</a:t>
                 </a:r>
-                <a:endParaRPr lang="en-US" sz="2000" dirty="0" smtClean="0"/>
               </a:p>
             </p:txBody>
           </p:sp>
@@ -8865,7 +8967,6 @@
                 <a:rPr lang="en-US" sz="1200" dirty="0" smtClean="0"/>
                 <a:t>Private Cert</a:t>
               </a:r>
-              <a:endParaRPr lang="en-US" sz="1200" dirty="0" smtClean="0"/>
             </a:p>
           </p:txBody>
         </p:sp>
@@ -8961,7 +9062,6 @@
                 <a:rPr lang="en-US" sz="1200" dirty="0" smtClean="0"/>
                 <a:t>Secret Identifier</a:t>
               </a:r>
-              <a:endParaRPr lang="en-US" sz="1200" dirty="0" smtClean="0"/>
             </a:p>
           </p:txBody>
         </p:sp>
@@ -9032,6 +9132,92 @@
           </a:fontRef>
         </p:style>
       </p:cxnSp>
+      <p:grpSp>
+        <p:nvGrpSpPr>
+          <p:cNvPr id="2072" name="Group 2071"/>
+          <p:cNvGrpSpPr/>
+          <p:nvPr/>
+        </p:nvGrpSpPr>
+        <p:grpSpPr>
+          <a:xfrm>
+            <a:off x="7845136" y="1974273"/>
+            <a:ext cx="1524231" cy="995611"/>
+            <a:chOff x="7845136" y="1974273"/>
+            <a:chExt cx="1524231" cy="995611"/>
+          </a:xfrm>
+        </p:grpSpPr>
+        <p:cxnSp>
+          <p:nvCxnSpPr>
+            <p:cNvPr id="2067" name="Straight Arrow Connector 2066"/>
+            <p:cNvCxnSpPr/>
+            <p:nvPr/>
+          </p:nvCxnSpPr>
+          <p:spPr>
+            <a:xfrm>
+              <a:off x="7845136" y="1974273"/>
+              <a:ext cx="1365163" cy="995611"/>
+            </a:xfrm>
+            <a:prstGeom prst="straightConnector1">
+              <a:avLst/>
+            </a:prstGeom>
+            <a:ln>
+              <a:tailEnd type="triangle"/>
+            </a:ln>
+          </p:spPr>
+          <p:style>
+            <a:lnRef idx="3">
+              <a:schemeClr val="accent1"/>
+            </a:lnRef>
+            <a:fillRef idx="0">
+              <a:schemeClr val="accent1"/>
+            </a:fillRef>
+            <a:effectRef idx="2">
+              <a:schemeClr val="accent1"/>
+            </a:effectRef>
+            <a:fontRef idx="minor">
+              <a:schemeClr val="tx1"/>
+            </a:fontRef>
+          </p:style>
+        </p:cxnSp>
+        <p:sp>
+          <p:nvSpPr>
+            <p:cNvPr id="2071" name="TextBox 2070"/>
+            <p:cNvSpPr txBox="1"/>
+            <p:nvPr/>
+          </p:nvSpPr>
+          <p:spPr>
+            <a:xfrm>
+              <a:off x="8520545" y="2067791"/>
+              <a:ext cx="848822" cy="307777"/>
+            </a:xfrm>
+            <a:prstGeom prst="rect">
+              <a:avLst/>
+            </a:prstGeom>
+            <a:noFill/>
+            <a:ln w="3175">
+              <a:noFill/>
+            </a:ln>
+          </p:spPr>
+          <p:txBody>
+            <a:bodyPr wrap="none" lIns="0" tIns="0" rIns="0" bIns="0" rtlCol="0">
+              <a:spAutoFit/>
+            </a:bodyPr>
+            <a:lstStyle/>
+            <a:p>
+              <a:pPr>
+                <a:buClr>
+                  <a:schemeClr val="accent1"/>
+                </a:buClr>
+                <a:buSzPct val="85000"/>
+              </a:pPr>
+              <a:r>
+                <a:rPr lang="en-US" sz="2000" dirty="0" smtClean="0"/>
+                <a:t>Granted</a:t>
+              </a:r>
+            </a:p>
+          </p:txBody>
+        </p:sp>
+      </p:grpSp>
     </p:spTree>
     <p:extLst>
       <p:ext uri="{BB962C8B-B14F-4D97-AF65-F5344CB8AC3E}">
@@ -9270,7 +9456,7 @@
                                           </p:stCondLst>
                                         </p:cTn>
                                         <p:tgtEl>
-                                          <p:spTgt spid="2055"/>
+                                          <p:spTgt spid="2072"/>
                                         </p:tgtEl>
                                         <p:attrNameLst>
                                           <p:attrName>style.visibility</p:attrName>
@@ -9284,7 +9470,7 @@
                                       <p:cBhvr>
                                         <p:cTn id="25" dur="500"/>
                                         <p:tgtEl>
-                                          <p:spTgt spid="2055"/>
+                                          <p:spTgt spid="2072"/>
                                         </p:tgtEl>
                                       </p:cBhvr>
                                     </p:animEffect>
@@ -9310,7 +9496,7 @@
                             </p:stCondLst>
                             <p:childTnLst>
                               <p:par>
-                                <p:cTn id="28" presetID="22" presetClass="entr" presetSubtype="8" fill="hold" nodeType="clickEffect">
+                                <p:cTn id="28" presetID="22" presetClass="entr" presetSubtype="1" fill="hold" nodeType="clickEffect">
                                   <p:stCondLst>
                                     <p:cond delay="0"/>
                                   </p:stCondLst>
@@ -9318,6 +9504,59 @@
                                     <p:set>
                                       <p:cBhvr>
                                         <p:cTn id="29" dur="1" fill="hold">
+                                          <p:stCondLst>
+                                            <p:cond delay="0"/>
+                                          </p:stCondLst>
+                                        </p:cTn>
+                                        <p:tgtEl>
+                                          <p:spTgt spid="2055"/>
+                                        </p:tgtEl>
+                                        <p:attrNameLst>
+                                          <p:attrName>style.visibility</p:attrName>
+                                        </p:attrNameLst>
+                                      </p:cBhvr>
+                                      <p:to>
+                                        <p:strVal val="visible"/>
+                                      </p:to>
+                                    </p:set>
+                                    <p:animEffect transition="in" filter="wipe(up)">
+                                      <p:cBhvr>
+                                        <p:cTn id="30" dur="500"/>
+                                        <p:tgtEl>
+                                          <p:spTgt spid="2055"/>
+                                        </p:tgtEl>
+                                      </p:cBhvr>
+                                    </p:animEffect>
+                                  </p:childTnLst>
+                                </p:cTn>
+                              </p:par>
+                            </p:childTnLst>
+                          </p:cTn>
+                        </p:par>
+                      </p:childTnLst>
+                    </p:cTn>
+                  </p:par>
+                  <p:par>
+                    <p:cTn id="31" fill="hold">
+                      <p:stCondLst>
+                        <p:cond delay="indefinite"/>
+                      </p:stCondLst>
+                      <p:childTnLst>
+                        <p:par>
+                          <p:cTn id="32" fill="hold">
+                            <p:stCondLst>
+                              <p:cond delay="0"/>
+                            </p:stCondLst>
+                            <p:childTnLst>
+                              <p:par>
+                                <p:cTn id="33" presetID="22" presetClass="entr" presetSubtype="8" fill="hold" nodeType="clickEffect">
+                                  <p:stCondLst>
+                                    <p:cond delay="0"/>
+                                  </p:stCondLst>
+                                  <p:childTnLst>
+                                    <p:set>
+                                      <p:cBhvr>
+                                        <p:cTn id="34" dur="1" fill="hold">
                                           <p:stCondLst>
                                             <p:cond delay="0"/>
                                           </p:stCondLst>
@@ -9335,7 +9574,7 @@
                                     </p:set>
                                     <p:animEffect transition="in" filter="wipe(left)">
                                       <p:cBhvr>
-                                        <p:cTn id="30" dur="500"/>
+                                        <p:cTn id="35" dur="500"/>
                                         <p:tgtEl>
                                           <p:spTgt spid="2056"/>
                                         </p:tgtEl>
@@ -9345,14 +9584,14 @@
                                 </p:cTn>
                               </p:par>
                               <p:par>
-                                <p:cTn id="31" presetID="22" presetClass="entr" presetSubtype="8" fill="hold" grpId="0" nodeType="withEffect">
+                                <p:cTn id="36" presetID="22" presetClass="entr" presetSubtype="8" fill="hold" grpId="0" nodeType="withEffect">
                                   <p:stCondLst>
                                     <p:cond delay="0"/>
                                   </p:stCondLst>
                                   <p:childTnLst>
                                     <p:set>
                                       <p:cBhvr>
-                                        <p:cTn id="32" dur="1" fill="hold">
+                                        <p:cTn id="37" dur="1" fill="hold">
                                           <p:stCondLst>
                                             <p:cond delay="0"/>
                                           </p:stCondLst>
@@ -9370,62 +9609,9 @@
                                     </p:set>
                                     <p:animEffect transition="in" filter="wipe(left)">
                                       <p:cBhvr>
-                                        <p:cTn id="33" dur="500"/>
+                                        <p:cTn id="38" dur="500"/>
                                         <p:tgtEl>
                                           <p:spTgt spid="54"/>
-                                        </p:tgtEl>
-                                      </p:cBhvr>
-                                    </p:animEffect>
-                                  </p:childTnLst>
-                                </p:cTn>
-                              </p:par>
-                            </p:childTnLst>
-                          </p:cTn>
-                        </p:par>
-                      </p:childTnLst>
-                    </p:cTn>
-                  </p:par>
-                  <p:par>
-                    <p:cTn id="34" fill="hold">
-                      <p:stCondLst>
-                        <p:cond delay="indefinite"/>
-                      </p:stCondLst>
-                      <p:childTnLst>
-                        <p:par>
-                          <p:cTn id="35" fill="hold">
-                            <p:stCondLst>
-                              <p:cond delay="0"/>
-                            </p:stCondLst>
-                            <p:childTnLst>
-                              <p:par>
-                                <p:cTn id="36" presetID="22" presetClass="entr" presetSubtype="8" fill="hold" nodeType="clickEffect">
-                                  <p:stCondLst>
-                                    <p:cond delay="0"/>
-                                  </p:stCondLst>
-                                  <p:childTnLst>
-                                    <p:set>
-                                      <p:cBhvr>
-                                        <p:cTn id="37" dur="1" fill="hold">
-                                          <p:stCondLst>
-                                            <p:cond delay="0"/>
-                                          </p:stCondLst>
-                                        </p:cTn>
-                                        <p:tgtEl>
-                                          <p:spTgt spid="2048"/>
-                                        </p:tgtEl>
-                                        <p:attrNameLst>
-                                          <p:attrName>style.visibility</p:attrName>
-                                        </p:attrNameLst>
-                                      </p:cBhvr>
-                                      <p:to>
-                                        <p:strVal val="visible"/>
-                                      </p:to>
-                                    </p:set>
-                                    <p:animEffect transition="in" filter="wipe(left)">
-                                      <p:cBhvr>
-                                        <p:cTn id="38" dur="500"/>
-                                        <p:tgtEl>
-                                          <p:spTgt spid="2048"/>
                                         </p:tgtEl>
                                       </p:cBhvr>
                                     </p:animEffect>
@@ -9451,7 +9637,7 @@
                             </p:stCondLst>
                             <p:childTnLst>
                               <p:par>
-                                <p:cTn id="41" presetID="10" presetClass="entr" presetSubtype="0" fill="hold" nodeType="clickEffect">
+                                <p:cTn id="41" presetID="22" presetClass="entr" presetSubtype="8" fill="hold" nodeType="clickEffect">
                                   <p:stCondLst>
                                     <p:cond delay="0"/>
                                   </p:stCondLst>
@@ -9464,7 +9650,7 @@
                                           </p:stCondLst>
                                         </p:cTn>
                                         <p:tgtEl>
-                                          <p:spTgt spid="2058"/>
+                                          <p:spTgt spid="2048"/>
                                         </p:tgtEl>
                                         <p:attrNameLst>
                                           <p:attrName>style.visibility</p:attrName>
@@ -9474,11 +9660,11 @@
                                         <p:strVal val="visible"/>
                                       </p:to>
                                     </p:set>
-                                    <p:animEffect transition="in" filter="fade">
+                                    <p:animEffect transition="in" filter="wipe(left)">
                                       <p:cBhvr>
                                         <p:cTn id="43" dur="500"/>
                                         <p:tgtEl>
-                                          <p:spTgt spid="2058"/>
+                                          <p:spTgt spid="2048"/>
                                         </p:tgtEl>
                                       </p:cBhvr>
                                     </p:animEffect>
@@ -9504,14 +9690,67 @@
                             </p:stCondLst>
                             <p:childTnLst>
                               <p:par>
-                                <p:cTn id="46" presetID="10" presetClass="exit" presetSubtype="0" fill="hold" nodeType="clickEffect">
+                                <p:cTn id="46" presetID="10" presetClass="entr" presetSubtype="0" fill="hold" nodeType="clickEffect">
+                                  <p:stCondLst>
+                                    <p:cond delay="0"/>
+                                  </p:stCondLst>
+                                  <p:childTnLst>
+                                    <p:set>
+                                      <p:cBhvr>
+                                        <p:cTn id="47" dur="1" fill="hold">
+                                          <p:stCondLst>
+                                            <p:cond delay="0"/>
+                                          </p:stCondLst>
+                                        </p:cTn>
+                                        <p:tgtEl>
+                                          <p:spTgt spid="2058"/>
+                                        </p:tgtEl>
+                                        <p:attrNameLst>
+                                          <p:attrName>style.visibility</p:attrName>
+                                        </p:attrNameLst>
+                                      </p:cBhvr>
+                                      <p:to>
+                                        <p:strVal val="visible"/>
+                                      </p:to>
+                                    </p:set>
+                                    <p:animEffect transition="in" filter="fade">
+                                      <p:cBhvr>
+                                        <p:cTn id="48" dur="500"/>
+                                        <p:tgtEl>
+                                          <p:spTgt spid="2058"/>
+                                        </p:tgtEl>
+                                      </p:cBhvr>
+                                    </p:animEffect>
+                                  </p:childTnLst>
+                                </p:cTn>
+                              </p:par>
+                            </p:childTnLst>
+                          </p:cTn>
+                        </p:par>
+                      </p:childTnLst>
+                    </p:cTn>
+                  </p:par>
+                  <p:par>
+                    <p:cTn id="49" fill="hold">
+                      <p:stCondLst>
+                        <p:cond delay="indefinite"/>
+                      </p:stCondLst>
+                      <p:childTnLst>
+                        <p:par>
+                          <p:cTn id="50" fill="hold">
+                            <p:stCondLst>
+                              <p:cond delay="0"/>
+                            </p:stCondLst>
+                            <p:childTnLst>
+                              <p:par>
+                                <p:cTn id="51" presetID="10" presetClass="exit" presetSubtype="0" fill="hold" nodeType="clickEffect">
                                   <p:stCondLst>
                                     <p:cond delay="0"/>
                                   </p:stCondLst>
                                   <p:childTnLst>
                                     <p:animEffect transition="out" filter="fade">
                                       <p:cBhvr>
-                                        <p:cTn id="47" dur="500"/>
+                                        <p:cTn id="52" dur="500"/>
                                         <p:tgtEl>
                                           <p:spTgt spid="56"/>
                                         </p:tgtEl>
@@ -9519,7 +9758,7 @@
                                     </p:animEffect>
                                     <p:set>
                                       <p:cBhvr>
-                                        <p:cTn id="48" dur="1" fill="hold">
+                                        <p:cTn id="53" dur="1" fill="hold">
                                           <p:stCondLst>
                                             <p:cond delay="499"/>
                                           </p:stCondLst>
@@ -9539,14 +9778,14 @@
                                 </p:cTn>
                               </p:par>
                               <p:par>
-                                <p:cTn id="49" presetID="10" presetClass="exit" presetSubtype="0" fill="hold" nodeType="withEffect">
+                                <p:cTn id="54" presetID="10" presetClass="exit" presetSubtype="0" fill="hold" nodeType="withEffect">
                                   <p:stCondLst>
                                     <p:cond delay="0"/>
                                   </p:stCondLst>
                                   <p:childTnLst>
                                     <p:animEffect transition="out" filter="fade">
                                       <p:cBhvr>
-                                        <p:cTn id="50" dur="500"/>
+                                        <p:cTn id="55" dur="500"/>
                                         <p:tgtEl>
                                           <p:spTgt spid="2048"/>
                                         </p:tgtEl>
@@ -9554,7 +9793,7 @@
                                     </p:animEffect>
                                     <p:set>
                                       <p:cBhvr>
-                                        <p:cTn id="51" dur="1" fill="hold">
+                                        <p:cTn id="56" dur="1" fill="hold">
                                           <p:stCondLst>
                                             <p:cond delay="499"/>
                                           </p:stCondLst>
@@ -9574,14 +9813,14 @@
                                 </p:cTn>
                               </p:par>
                               <p:par>
-                                <p:cTn id="52" presetID="10" presetClass="exit" presetSubtype="0" fill="hold" nodeType="withEffect">
+                                <p:cTn id="57" presetID="10" presetClass="exit" presetSubtype="0" fill="hold" nodeType="withEffect">
                                   <p:stCondLst>
                                     <p:cond delay="0"/>
                                   </p:stCondLst>
                                   <p:childTnLst>
                                     <p:animEffect transition="out" filter="fade">
                                       <p:cBhvr>
-                                        <p:cTn id="53" dur="500"/>
+                                        <p:cTn id="58" dur="500"/>
                                         <p:tgtEl>
                                           <p:spTgt spid="2056"/>
                                         </p:tgtEl>
@@ -9589,7 +9828,7 @@
                                     </p:animEffect>
                                     <p:set>
                                       <p:cBhvr>
-                                        <p:cTn id="54" dur="1" fill="hold">
+                                        <p:cTn id="59" dur="1" fill="hold">
                                           <p:stCondLst>
                                             <p:cond delay="499"/>
                                           </p:stCondLst>
@@ -9609,14 +9848,14 @@
                                 </p:cTn>
                               </p:par>
                               <p:par>
-                                <p:cTn id="55" presetID="10" presetClass="exit" presetSubtype="0" fill="hold" nodeType="withEffect">
+                                <p:cTn id="60" presetID="10" presetClass="exit" presetSubtype="0" fill="hold" nodeType="withEffect">
                                   <p:stCondLst>
                                     <p:cond delay="0"/>
                                   </p:stCondLst>
                                   <p:childTnLst>
                                     <p:animEffect transition="out" filter="fade">
                                       <p:cBhvr>
-                                        <p:cTn id="56" dur="500"/>
+                                        <p:cTn id="61" dur="500"/>
                                         <p:tgtEl>
                                           <p:spTgt spid="2055"/>
                                         </p:tgtEl>
@@ -9624,7 +9863,7 @@
                                     </p:animEffect>
                                     <p:set>
                                       <p:cBhvr>
-                                        <p:cTn id="57" dur="1" fill="hold">
+                                        <p:cTn id="62" dur="1" fill="hold">
                                           <p:stCondLst>
                                             <p:cond delay="499"/>
                                           </p:stCondLst>
@@ -9644,14 +9883,14 @@
                                 </p:cTn>
                               </p:par>
                               <p:par>
-                                <p:cTn id="58" presetID="10" presetClass="exit" presetSubtype="0" fill="hold" nodeType="withEffect">
+                                <p:cTn id="63" presetID="10" presetClass="exit" presetSubtype="0" fill="hold" nodeType="withEffect">
                                   <p:stCondLst>
                                     <p:cond delay="0"/>
                                   </p:stCondLst>
                                   <p:childTnLst>
                                     <p:animEffect transition="out" filter="fade">
                                       <p:cBhvr>
-                                        <p:cTn id="59" dur="500"/>
+                                        <p:cTn id="64" dur="500"/>
                                         <p:tgtEl>
                                           <p:spTgt spid="2053"/>
                                         </p:tgtEl>
@@ -9659,7 +9898,7 @@
                                     </p:animEffect>
                                     <p:set>
                                       <p:cBhvr>
-                                        <p:cTn id="60" dur="1" fill="hold">
+                                        <p:cTn id="65" dur="1" fill="hold">
                                           <p:stCondLst>
                                             <p:cond delay="499"/>
                                           </p:stCondLst>
@@ -9679,14 +9918,14 @@
                                 </p:cTn>
                               </p:par>
                               <p:par>
-                                <p:cTn id="61" presetID="10" presetClass="exit" presetSubtype="0" fill="hold" nodeType="withEffect">
+                                <p:cTn id="66" presetID="10" presetClass="exit" presetSubtype="0" fill="hold" nodeType="withEffect">
                                   <p:stCondLst>
                                     <p:cond delay="0"/>
                                   </p:stCondLst>
                                   <p:childTnLst>
                                     <p:animEffect transition="out" filter="fade">
                                       <p:cBhvr>
-                                        <p:cTn id="62" dur="500"/>
+                                        <p:cTn id="67" dur="500"/>
                                         <p:tgtEl>
                                           <p:spTgt spid="2054"/>
                                         </p:tgtEl>
@@ -9694,13 +9933,48 @@
                                     </p:animEffect>
                                     <p:set>
                                       <p:cBhvr>
-                                        <p:cTn id="63" dur="1" fill="hold">
+                                        <p:cTn id="68" dur="1" fill="hold">
                                           <p:stCondLst>
                                             <p:cond delay="499"/>
                                           </p:stCondLst>
                                         </p:cTn>
                                         <p:tgtEl>
                                           <p:spTgt spid="2054"/>
+                                        </p:tgtEl>
+                                        <p:attrNameLst>
+                                          <p:attrName>style.visibility</p:attrName>
+                                        </p:attrNameLst>
+                                      </p:cBhvr>
+                                      <p:to>
+                                        <p:strVal val="hidden"/>
+                                      </p:to>
+                                    </p:set>
+                                  </p:childTnLst>
+                                </p:cTn>
+                              </p:par>
+                              <p:par>
+                                <p:cTn id="69" presetID="10" presetClass="exit" presetSubtype="0" fill="hold" nodeType="withEffect">
+                                  <p:stCondLst>
+                                    <p:cond delay="0"/>
+                                  </p:stCondLst>
+                                  <p:childTnLst>
+                                    <p:animEffect transition="out" filter="fade">
+                                      <p:cBhvr>
+                                        <p:cTn id="70" dur="500"/>
+                                        <p:tgtEl>
+                                          <p:spTgt spid="2072"/>
+                                        </p:tgtEl>
+                                      </p:cBhvr>
+                                    </p:animEffect>
+                                    <p:set>
+                                      <p:cBhvr>
+                                        <p:cTn id="71" dur="1" fill="hold">
+                                          <p:stCondLst>
+                                            <p:cond delay="499"/>
+                                          </p:stCondLst>
+                                        </p:cTn>
+                                        <p:tgtEl>
+                                          <p:spTgt spid="2072"/>
                                         </p:tgtEl>
                                         <p:attrNameLst>
                                           <p:attrName>style.visibility</p:attrName>
@@ -9720,26 +9994,26 @@
                     </p:cTn>
                   </p:par>
                   <p:par>
-                    <p:cTn id="64" fill="hold">
+                    <p:cTn id="72" fill="hold">
                       <p:stCondLst>
                         <p:cond delay="indefinite"/>
                       </p:stCondLst>
                       <p:childTnLst>
                         <p:par>
-                          <p:cTn id="65" fill="hold">
+                          <p:cTn id="73" fill="hold">
                             <p:stCondLst>
                               <p:cond delay="0"/>
                             </p:stCondLst>
                             <p:childTnLst>
                               <p:par>
-                                <p:cTn id="66" presetID="10" presetClass="entr" presetSubtype="0" fill="hold" nodeType="clickEffect">
+                                <p:cTn id="74" presetID="10" presetClass="entr" presetSubtype="0" fill="hold" nodeType="clickEffect">
                                   <p:stCondLst>
                                     <p:cond delay="0"/>
                                   </p:stCondLst>
                                   <p:childTnLst>
                                     <p:set>
                                       <p:cBhvr>
-                                        <p:cTn id="67" dur="1" fill="hold">
+                                        <p:cTn id="75" dur="1" fill="hold">
                                           <p:stCondLst>
                                             <p:cond delay="0"/>
                                           </p:stCondLst>
@@ -9757,7 +10031,7 @@
                                     </p:set>
                                     <p:animEffect transition="in" filter="fade">
                                       <p:cBhvr>
-                                        <p:cTn id="68" dur="500"/>
+                                        <p:cTn id="76" dur="500"/>
                                         <p:tgtEl>
                                           <p:spTgt spid="2061"/>
                                         </p:tgtEl>
@@ -9767,14 +10041,14 @@
                                 </p:cTn>
                               </p:par>
                               <p:par>
-                                <p:cTn id="69" presetID="10" presetClass="entr" presetSubtype="0" fill="hold" nodeType="withEffect">
+                                <p:cTn id="77" presetID="10" presetClass="entr" presetSubtype="0" fill="hold" nodeType="withEffect">
                                   <p:stCondLst>
                                     <p:cond delay="0"/>
                                   </p:stCondLst>
                                   <p:childTnLst>
                                     <p:set>
                                       <p:cBhvr>
-                                        <p:cTn id="70" dur="1" fill="hold">
+                                        <p:cTn id="78" dur="1" fill="hold">
                                           <p:stCondLst>
                                             <p:cond delay="0"/>
                                           </p:stCondLst>
@@ -9792,7 +10066,7 @@
                                     </p:set>
                                     <p:animEffect transition="in" filter="fade">
                                       <p:cBhvr>
-                                        <p:cTn id="71" dur="500"/>
+                                        <p:cTn id="79" dur="500"/>
                                         <p:tgtEl>
                                           <p:spTgt spid="2063"/>
                                         </p:tgtEl>
@@ -9871,7 +10145,7 @@
           <a:p>
             <a:fld id="{8838DC5F-BE50-418E-B541-A41F452E432A}" type="datetime1">
               <a:rPr lang="en-US" smtClean="0"/>
-              <a:t>3/14/2018</a:t>
+              <a:t>3/21/2018</a:t>
             </a:fld>
             <a:endParaRPr lang="de-DE" dirty="0"/>
           </a:p>
@@ -9907,15 +10181,7 @@
             </a:r>
             <a:r>
               <a:rPr lang="en-US" noProof="0" dirty="0" smtClean="0"/>
-              <a:t>Managed </a:t>
-            </a:r>
-            <a:r>
-              <a:rPr lang="en-US" noProof="0" dirty="0" smtClean="0"/>
-              <a:t>Service </a:t>
-            </a:r>
-            <a:r>
-              <a:rPr lang="en-US" noProof="0" dirty="0" smtClean="0"/>
-              <a:t>Identity</a:t>
+              <a:t>Managed Service Identity</a:t>
             </a:r>
             <a:endParaRPr lang="en-US" noProof="0" dirty="0"/>
           </a:p>
@@ -10901,7 +11167,7 @@
           <a:p>
             <a:fld id="{857FC863-F681-433C-ADBD-D56EB4510D24}" type="datetime1">
               <a:rPr lang="en-US" smtClean="0"/>
-              <a:t>3/14/2018</a:t>
+              <a:t>3/21/2018</a:t>
             </a:fld>
             <a:endParaRPr lang="en-US" dirty="0"/>
           </a:p>
@@ -11234,7 +11500,7 @@
           <a:p>
             <a:fld id="{2BA7B0A6-06E1-4F07-B687-685214158A38}" type="datetime1">
               <a:rPr lang="en-US" smtClean="0"/>
-              <a:t>3/14/2018</a:t>
+              <a:t>3/21/2018</a:t>
             </a:fld>
             <a:endParaRPr lang="en-US" dirty="0"/>
           </a:p>
@@ -11287,7 +11553,6 @@
               <a:rPr lang="en-US" noProof="0" dirty="0" smtClean="0"/>
               <a:t>Accessing key vault</a:t>
             </a:r>
-            <a:endParaRPr lang="en-US" noProof="0" dirty="0" smtClean="0"/>
           </a:p>
           <a:p>
             <a:endParaRPr lang="en-US" noProof="0" dirty="0"/>
@@ -11318,7 +11583,6 @@
               <a:rPr lang="en-US" noProof="0" dirty="0" smtClean="0"/>
               <a:t>(DEMO) ARM VM Client certificate injection</a:t>
             </a:r>
-            <a:endParaRPr lang="en-US" noProof="0" dirty="0" smtClean="0"/>
           </a:p>
           <a:p>
             <a:endParaRPr lang="en-US" noProof="0" dirty="0"/>
@@ -11347,9 +11611,16 @@
           <a:p>
             <a:r>
               <a:rPr lang="en-US" noProof="0" dirty="0" smtClean="0"/>
-              <a:t>(Preview) Managed Service Identity</a:t>
-            </a:r>
-            <a:endParaRPr lang="en-US" noProof="0" dirty="0" smtClean="0"/>
+              <a:t>(Preview) </a:t>
+            </a:r>
+            <a:r>
+              <a:rPr lang="en-US" noProof="0" dirty="0" smtClean="0"/>
+              <a:t>Azure Managed </a:t>
+            </a:r>
+            <a:r>
+              <a:rPr lang="en-US" noProof="0" dirty="0" smtClean="0"/>
+              <a:t>Service Identity</a:t>
+            </a:r>
           </a:p>
           <a:p>
             <a:endParaRPr lang="en-US" noProof="0" dirty="0"/>
@@ -11435,13 +11706,8 @@
           <a:p>
             <a:r>
               <a:rPr lang="en-US" noProof="0" dirty="0" smtClean="0"/>
-              <a:t>Azure Key </a:t>
-            </a:r>
-            <a:r>
-              <a:rPr lang="en-US" noProof="0" dirty="0" smtClean="0"/>
-              <a:t>Vault</a:t>
-            </a:r>
-            <a:endParaRPr lang="en-US" noProof="0" dirty="0" smtClean="0"/>
+              <a:t>Azure Key Vault</a:t>
+            </a:r>
           </a:p>
         </p:txBody>
       </p:sp>
@@ -11499,7 +11765,7 @@
           <a:p>
             <a:fld id="{8838DC5F-BE50-418E-B541-A41F452E432A}" type="datetime1">
               <a:rPr lang="en-US" smtClean="0"/>
-              <a:t>3/14/2018</a:t>
+              <a:t>3/21/2018</a:t>
             </a:fld>
             <a:endParaRPr lang="de-DE" dirty="0"/>
           </a:p>
@@ -13003,340 +13269,9 @@
   <p:timing>
     <p:tnLst>
       <p:par>
-        <p:cTn id="1" dur="indefinite" restart="never" nodeType="tmRoot">
-          <p:childTnLst>
-            <p:seq concurrent="1" nextAc="seek">
-              <p:cTn id="2" dur="indefinite" nodeType="mainSeq">
-                <p:childTnLst>
-                  <p:par>
-                    <p:cTn id="3" fill="hold">
-                      <p:stCondLst>
-                        <p:cond delay="indefinite"/>
-                      </p:stCondLst>
-                      <p:childTnLst>
-                        <p:par>
-                          <p:cTn id="4" fill="hold">
-                            <p:stCondLst>
-                              <p:cond delay="0"/>
-                            </p:stCondLst>
-                            <p:childTnLst>
-                              <p:par>
-                                <p:cTn id="5" presetID="10" presetClass="entr" presetSubtype="0" fill="hold" grpId="0" nodeType="clickEffect">
-                                  <p:stCondLst>
-                                    <p:cond delay="0"/>
-                                  </p:stCondLst>
-                                  <p:childTnLst>
-                                    <p:set>
-                                      <p:cBhvr>
-                                        <p:cTn id="6" dur="1" fill="hold">
-                                          <p:stCondLst>
-                                            <p:cond delay="0"/>
-                                          </p:stCondLst>
-                                        </p:cTn>
-                                        <p:tgtEl>
-                                          <p:spTgt spid="33"/>
-                                        </p:tgtEl>
-                                        <p:attrNameLst>
-                                          <p:attrName>style.visibility</p:attrName>
-                                        </p:attrNameLst>
-                                      </p:cBhvr>
-                                      <p:to>
-                                        <p:strVal val="visible"/>
-                                      </p:to>
-                                    </p:set>
-                                    <p:animEffect transition="in" filter="fade">
-                                      <p:cBhvr>
-                                        <p:cTn id="7" dur="500"/>
-                                        <p:tgtEl>
-                                          <p:spTgt spid="33"/>
-                                        </p:tgtEl>
-                                      </p:cBhvr>
-                                    </p:animEffect>
-                                  </p:childTnLst>
-                                </p:cTn>
-                              </p:par>
-                              <p:par>
-                                <p:cTn id="8" presetID="10" presetClass="entr" presetSubtype="0" fill="hold" grpId="0" nodeType="withEffect">
-                                  <p:stCondLst>
-                                    <p:cond delay="0"/>
-                                  </p:stCondLst>
-                                  <p:childTnLst>
-                                    <p:set>
-                                      <p:cBhvr>
-                                        <p:cTn id="9" dur="1" fill="hold">
-                                          <p:stCondLst>
-                                            <p:cond delay="0"/>
-                                          </p:stCondLst>
-                                        </p:cTn>
-                                        <p:tgtEl>
-                                          <p:spTgt spid="35"/>
-                                        </p:tgtEl>
-                                        <p:attrNameLst>
-                                          <p:attrName>style.visibility</p:attrName>
-                                        </p:attrNameLst>
-                                      </p:cBhvr>
-                                      <p:to>
-                                        <p:strVal val="visible"/>
-                                      </p:to>
-                                    </p:set>
-                                    <p:animEffect transition="in" filter="fade">
-                                      <p:cBhvr>
-                                        <p:cTn id="10" dur="500"/>
-                                        <p:tgtEl>
-                                          <p:spTgt spid="35"/>
-                                        </p:tgtEl>
-                                      </p:cBhvr>
-                                    </p:animEffect>
-                                  </p:childTnLst>
-                                </p:cTn>
-                              </p:par>
-                              <p:par>
-                                <p:cTn id="11" presetID="10" presetClass="entr" presetSubtype="0" fill="hold" grpId="0" nodeType="withEffect">
-                                  <p:stCondLst>
-                                    <p:cond delay="0"/>
-                                  </p:stCondLst>
-                                  <p:childTnLst>
-                                    <p:set>
-                                      <p:cBhvr>
-                                        <p:cTn id="12" dur="1" fill="hold">
-                                          <p:stCondLst>
-                                            <p:cond delay="0"/>
-                                          </p:stCondLst>
-                                        </p:cTn>
-                                        <p:tgtEl>
-                                          <p:spTgt spid="36"/>
-                                        </p:tgtEl>
-                                        <p:attrNameLst>
-                                          <p:attrName>style.visibility</p:attrName>
-                                        </p:attrNameLst>
-                                      </p:cBhvr>
-                                      <p:to>
-                                        <p:strVal val="visible"/>
-                                      </p:to>
-                                    </p:set>
-                                    <p:animEffect transition="in" filter="fade">
-                                      <p:cBhvr>
-                                        <p:cTn id="13" dur="500"/>
-                                        <p:tgtEl>
-                                          <p:spTgt spid="36"/>
-                                        </p:tgtEl>
-                                      </p:cBhvr>
-                                    </p:animEffect>
-                                  </p:childTnLst>
-                                </p:cTn>
-                              </p:par>
-                              <p:par>
-                                <p:cTn id="14" presetID="10" presetClass="entr" presetSubtype="0" fill="hold" grpId="0" nodeType="withEffect">
-                                  <p:stCondLst>
-                                    <p:cond delay="0"/>
-                                  </p:stCondLst>
-                                  <p:childTnLst>
-                                    <p:set>
-                                      <p:cBhvr>
-                                        <p:cTn id="15" dur="1" fill="hold">
-                                          <p:stCondLst>
-                                            <p:cond delay="0"/>
-                                          </p:stCondLst>
-                                        </p:cTn>
-                                        <p:tgtEl>
-                                          <p:spTgt spid="37"/>
-                                        </p:tgtEl>
-                                        <p:attrNameLst>
-                                          <p:attrName>style.visibility</p:attrName>
-                                        </p:attrNameLst>
-                                      </p:cBhvr>
-                                      <p:to>
-                                        <p:strVal val="visible"/>
-                                      </p:to>
-                                    </p:set>
-                                    <p:animEffect transition="in" filter="fade">
-                                      <p:cBhvr>
-                                        <p:cTn id="16" dur="500"/>
-                                        <p:tgtEl>
-                                          <p:spTgt spid="37"/>
-                                        </p:tgtEl>
-                                      </p:cBhvr>
-                                    </p:animEffect>
-                                  </p:childTnLst>
-                                </p:cTn>
-                              </p:par>
-                              <p:par>
-                                <p:cTn id="17" presetID="10" presetClass="entr" presetSubtype="0" fill="hold" grpId="0" nodeType="withEffect">
-                                  <p:stCondLst>
-                                    <p:cond delay="0"/>
-                                  </p:stCondLst>
-                                  <p:childTnLst>
-                                    <p:set>
-                                      <p:cBhvr>
-                                        <p:cTn id="18" dur="1" fill="hold">
-                                          <p:stCondLst>
-                                            <p:cond delay="0"/>
-                                          </p:stCondLst>
-                                        </p:cTn>
-                                        <p:tgtEl>
-                                          <p:spTgt spid="38"/>
-                                        </p:tgtEl>
-                                        <p:attrNameLst>
-                                          <p:attrName>style.visibility</p:attrName>
-                                        </p:attrNameLst>
-                                      </p:cBhvr>
-                                      <p:to>
-                                        <p:strVal val="visible"/>
-                                      </p:to>
-                                    </p:set>
-                                    <p:animEffect transition="in" filter="fade">
-                                      <p:cBhvr>
-                                        <p:cTn id="19" dur="500"/>
-                                        <p:tgtEl>
-                                          <p:spTgt spid="38"/>
-                                        </p:tgtEl>
-                                      </p:cBhvr>
-                                    </p:animEffect>
-                                  </p:childTnLst>
-                                </p:cTn>
-                              </p:par>
-                              <p:par>
-                                <p:cTn id="20" presetID="10" presetClass="entr" presetSubtype="0" fill="hold" grpId="0" nodeType="withEffect">
-                                  <p:stCondLst>
-                                    <p:cond delay="0"/>
-                                  </p:stCondLst>
-                                  <p:childTnLst>
-                                    <p:set>
-                                      <p:cBhvr>
-                                        <p:cTn id="21" dur="1" fill="hold">
-                                          <p:stCondLst>
-                                            <p:cond delay="0"/>
-                                          </p:stCondLst>
-                                        </p:cTn>
-                                        <p:tgtEl>
-                                          <p:spTgt spid="39"/>
-                                        </p:tgtEl>
-                                        <p:attrNameLst>
-                                          <p:attrName>style.visibility</p:attrName>
-                                        </p:attrNameLst>
-                                      </p:cBhvr>
-                                      <p:to>
-                                        <p:strVal val="visible"/>
-                                      </p:to>
-                                    </p:set>
-                                    <p:animEffect transition="in" filter="fade">
-                                      <p:cBhvr>
-                                        <p:cTn id="22" dur="500"/>
-                                        <p:tgtEl>
-                                          <p:spTgt spid="39"/>
-                                        </p:tgtEl>
-                                      </p:cBhvr>
-                                    </p:animEffect>
-                                  </p:childTnLst>
-                                </p:cTn>
-                              </p:par>
-                              <p:par>
-                                <p:cTn id="23" presetID="10" presetClass="entr" presetSubtype="0" fill="hold" grpId="0" nodeType="withEffect">
-                                  <p:stCondLst>
-                                    <p:cond delay="0"/>
-                                  </p:stCondLst>
-                                  <p:childTnLst>
-                                    <p:set>
-                                      <p:cBhvr>
-                                        <p:cTn id="24" dur="1" fill="hold">
-                                          <p:stCondLst>
-                                            <p:cond delay="0"/>
-                                          </p:stCondLst>
-                                        </p:cTn>
-                                        <p:tgtEl>
-                                          <p:spTgt spid="40"/>
-                                        </p:tgtEl>
-                                        <p:attrNameLst>
-                                          <p:attrName>style.visibility</p:attrName>
-                                        </p:attrNameLst>
-                                      </p:cBhvr>
-                                      <p:to>
-                                        <p:strVal val="visible"/>
-                                      </p:to>
-                                    </p:set>
-                                    <p:animEffect transition="in" filter="fade">
-                                      <p:cBhvr>
-                                        <p:cTn id="25" dur="500"/>
-                                        <p:tgtEl>
-                                          <p:spTgt spid="40"/>
-                                        </p:tgtEl>
-                                      </p:cBhvr>
-                                    </p:animEffect>
-                                  </p:childTnLst>
-                                </p:cTn>
-                              </p:par>
-                              <p:par>
-                                <p:cTn id="26" presetID="10" presetClass="entr" presetSubtype="0" fill="hold" grpId="0" nodeType="withEffect">
-                                  <p:stCondLst>
-                                    <p:cond delay="0"/>
-                                  </p:stCondLst>
-                                  <p:childTnLst>
-                                    <p:set>
-                                      <p:cBhvr>
-                                        <p:cTn id="27" dur="1" fill="hold">
-                                          <p:stCondLst>
-                                            <p:cond delay="0"/>
-                                          </p:stCondLst>
-                                        </p:cTn>
-                                        <p:tgtEl>
-                                          <p:spTgt spid="41"/>
-                                        </p:tgtEl>
-                                        <p:attrNameLst>
-                                          <p:attrName>style.visibility</p:attrName>
-                                        </p:attrNameLst>
-                                      </p:cBhvr>
-                                      <p:to>
-                                        <p:strVal val="visible"/>
-                                      </p:to>
-                                    </p:set>
-                                    <p:animEffect transition="in" filter="fade">
-                                      <p:cBhvr>
-                                        <p:cTn id="28" dur="500"/>
-                                        <p:tgtEl>
-                                          <p:spTgt spid="41"/>
-                                        </p:tgtEl>
-                                      </p:cBhvr>
-                                    </p:animEffect>
-                                  </p:childTnLst>
-                                </p:cTn>
-                              </p:par>
-                            </p:childTnLst>
-                          </p:cTn>
-                        </p:par>
-                      </p:childTnLst>
-                    </p:cTn>
-                  </p:par>
-                </p:childTnLst>
-              </p:cTn>
-              <p:prevCondLst>
-                <p:cond evt="onPrev" delay="0">
-                  <p:tgtEl>
-                    <p:sldTgt/>
-                  </p:tgtEl>
-                </p:cond>
-              </p:prevCondLst>
-              <p:nextCondLst>
-                <p:cond evt="onNext" delay="0">
-                  <p:tgtEl>
-                    <p:sldTgt/>
-                  </p:tgtEl>
-                </p:cond>
-              </p:nextCondLst>
-            </p:seq>
-          </p:childTnLst>
-        </p:cTn>
+        <p:cTn id="1" dur="indefinite" restart="never" nodeType="tmRoot"/>
       </p:par>
     </p:tnLst>
-    <p:bldLst>
-      <p:bldP spid="33" grpId="0" animBg="1"/>
-      <p:bldP spid="35" grpId="0"/>
-      <p:bldP spid="36" grpId="0"/>
-      <p:bldP spid="37" grpId="0"/>
-      <p:bldP spid="38" grpId="0"/>
-      <p:bldP spid="39" grpId="0"/>
-      <p:bldP spid="40" grpId="0"/>
-      <p:bldP spid="41" grpId="0"/>
-    </p:bldLst>
   </p:timing>
 </p:sld>
 </file>
@@ -14805,7 +14740,7 @@
           <a:p>
             <a:fld id="{8838DC5F-BE50-418E-B541-A41F452E432A}" type="datetime1">
               <a:rPr lang="en-US" smtClean="0"/>
-              <a:t>3/14/2018</a:t>
+              <a:t>3/21/2018</a:t>
             </a:fld>
             <a:endParaRPr lang="de-DE" dirty="0"/>
           </a:p>
@@ -17356,47 +17291,6 @@
           </a:p>
         </p:txBody>
       </p:sp>
-      <p:sp>
-        <p:nvSpPr>
-          <p:cNvPr id="124" name="TextBox 123"/>
-          <p:cNvSpPr txBox="1"/>
-          <p:nvPr/>
-        </p:nvSpPr>
-        <p:spPr>
-          <a:xfrm>
-            <a:off x="4501921" y="3234907"/>
-            <a:ext cx="2209631" cy="221599"/>
-          </a:xfrm>
-          <a:prstGeom prst="rect">
-            <a:avLst/>
-          </a:prstGeom>
-          <a:noFill/>
-        </p:spPr>
-        <p:txBody>
-          <a:bodyPr wrap="square" lIns="0" tIns="0" rIns="0" bIns="0" rtlCol="0">
-            <a:spAutoFit/>
-          </a:bodyPr>
-          <a:lstStyle/>
-          <a:p>
-            <a:pPr>
-              <a:lnSpc>
-                <a:spcPct val="90000"/>
-              </a:lnSpc>
-              <a:spcAft>
-                <a:spcPts val="600"/>
-              </a:spcAft>
-            </a:pPr>
-            <a:r>
-              <a:rPr lang="en-US" sz="1600" dirty="0" smtClean="0">
-                <a:solidFill>
-                  <a:schemeClr val="tx2"/>
-                </a:solidFill>
-              </a:rPr>
-              <a:t>Connection Strings</a:t>
-            </a:r>
-          </a:p>
-        </p:txBody>
-      </p:sp>
     </p:spTree>
     <p:extLst>
       <p:ext uri="{BB962C8B-B14F-4D97-AF65-F5344CB8AC3E}">
@@ -17410,281 +17304,9 @@
   <p:timing>
     <p:tnLst>
       <p:par>
-        <p:cTn id="1" dur="indefinite" restart="never" nodeType="tmRoot">
-          <p:childTnLst>
-            <p:seq concurrent="1" nextAc="seek">
-              <p:cTn id="2" dur="indefinite" nodeType="mainSeq">
-                <p:childTnLst>
-                  <p:par>
-                    <p:cTn id="3" fill="hold">
-                      <p:stCondLst>
-                        <p:cond delay="indefinite"/>
-                      </p:stCondLst>
-                      <p:childTnLst>
-                        <p:par>
-                          <p:cTn id="4" fill="hold">
-                            <p:stCondLst>
-                              <p:cond delay="0"/>
-                            </p:stCondLst>
-                            <p:childTnLst>
-                              <p:par>
-                                <p:cTn id="5" presetID="2" presetClass="entr" presetSubtype="8" fill="hold" nodeType="clickEffect">
-                                  <p:stCondLst>
-                                    <p:cond delay="0"/>
-                                  </p:stCondLst>
-                                  <p:childTnLst>
-                                    <p:set>
-                                      <p:cBhvr>
-                                        <p:cTn id="6" dur="1" fill="hold">
-                                          <p:stCondLst>
-                                            <p:cond delay="0"/>
-                                          </p:stCondLst>
-                                        </p:cTn>
-                                        <p:tgtEl>
-                                          <p:spTgt spid="34"/>
-                                        </p:tgtEl>
-                                        <p:attrNameLst>
-                                          <p:attrName>style.visibility</p:attrName>
-                                        </p:attrNameLst>
-                                      </p:cBhvr>
-                                      <p:to>
-                                        <p:strVal val="visible"/>
-                                      </p:to>
-                                    </p:set>
-                                    <p:anim calcmode="lin" valueType="num">
-                                      <p:cBhvr additive="base">
-                                        <p:cTn id="7" dur="500" fill="hold"/>
-                                        <p:tgtEl>
-                                          <p:spTgt spid="34"/>
-                                        </p:tgtEl>
-                                        <p:attrNameLst>
-                                          <p:attrName>ppt_x</p:attrName>
-                                        </p:attrNameLst>
-                                      </p:cBhvr>
-                                      <p:tavLst>
-                                        <p:tav tm="0">
-                                          <p:val>
-                                            <p:strVal val="0-#ppt_w/2"/>
-                                          </p:val>
-                                        </p:tav>
-                                        <p:tav tm="100000">
-                                          <p:val>
-                                            <p:strVal val="#ppt_x"/>
-                                          </p:val>
-                                        </p:tav>
-                                      </p:tavLst>
-                                    </p:anim>
-                                    <p:anim calcmode="lin" valueType="num">
-                                      <p:cBhvr additive="base">
-                                        <p:cTn id="8" dur="500" fill="hold"/>
-                                        <p:tgtEl>
-                                          <p:spTgt spid="34"/>
-                                        </p:tgtEl>
-                                        <p:attrNameLst>
-                                          <p:attrName>ppt_y</p:attrName>
-                                        </p:attrNameLst>
-                                      </p:cBhvr>
-                                      <p:tavLst>
-                                        <p:tav tm="0">
-                                          <p:val>
-                                            <p:strVal val="#ppt_y"/>
-                                          </p:val>
-                                        </p:tav>
-                                        <p:tav tm="100000">
-                                          <p:val>
-                                            <p:strVal val="#ppt_y"/>
-                                          </p:val>
-                                        </p:tav>
-                                      </p:tavLst>
-                                    </p:anim>
-                                  </p:childTnLst>
-                                </p:cTn>
-                              </p:par>
-                            </p:childTnLst>
-                          </p:cTn>
-                        </p:par>
-                        <p:par>
-                          <p:cTn id="9" fill="hold">
-                            <p:stCondLst>
-                              <p:cond delay="500"/>
-                            </p:stCondLst>
-                            <p:childTnLst>
-                              <p:par>
-                                <p:cTn id="10" presetID="2" presetClass="exit" presetSubtype="8" fill="hold" nodeType="afterEffect">
-                                  <p:stCondLst>
-                                    <p:cond delay="0"/>
-                                  </p:stCondLst>
-                                  <p:childTnLst>
-                                    <p:anim calcmode="lin" valueType="num">
-                                      <p:cBhvr additive="base">
-                                        <p:cTn id="11" dur="500"/>
-                                        <p:tgtEl>
-                                          <p:spTgt spid="34"/>
-                                        </p:tgtEl>
-                                        <p:attrNameLst>
-                                          <p:attrName>ppt_x</p:attrName>
-                                        </p:attrNameLst>
-                                      </p:cBhvr>
-                                      <p:tavLst>
-                                        <p:tav tm="0">
-                                          <p:val>
-                                            <p:strVal val="ppt_x"/>
-                                          </p:val>
-                                        </p:tav>
-                                        <p:tav tm="100000">
-                                          <p:val>
-                                            <p:strVal val="0-ppt_w/2"/>
-                                          </p:val>
-                                        </p:tav>
-                                      </p:tavLst>
-                                    </p:anim>
-                                    <p:anim calcmode="lin" valueType="num">
-                                      <p:cBhvr additive="base">
-                                        <p:cTn id="12" dur="500"/>
-                                        <p:tgtEl>
-                                          <p:spTgt spid="34"/>
-                                        </p:tgtEl>
-                                        <p:attrNameLst>
-                                          <p:attrName>ppt_y</p:attrName>
-                                        </p:attrNameLst>
-                                      </p:cBhvr>
-                                      <p:tavLst>
-                                        <p:tav tm="0">
-                                          <p:val>
-                                            <p:strVal val="ppt_y"/>
-                                          </p:val>
-                                        </p:tav>
-                                        <p:tav tm="100000">
-                                          <p:val>
-                                            <p:strVal val="ppt_y"/>
-                                          </p:val>
-                                        </p:tav>
-                                      </p:tavLst>
-                                    </p:anim>
-                                    <p:set>
-                                      <p:cBhvr>
-                                        <p:cTn id="13" dur="1" fill="hold">
-                                          <p:stCondLst>
-                                            <p:cond delay="499"/>
-                                          </p:stCondLst>
-                                        </p:cTn>
-                                        <p:tgtEl>
-                                          <p:spTgt spid="34"/>
-                                        </p:tgtEl>
-                                        <p:attrNameLst>
-                                          <p:attrName>style.visibility</p:attrName>
-                                        </p:attrNameLst>
-                                      </p:cBhvr>
-                                      <p:to>
-                                        <p:strVal val="hidden"/>
-                                      </p:to>
-                                    </p:set>
-                                  </p:childTnLst>
-                                </p:cTn>
-                              </p:par>
-                              <p:par>
-                                <p:cTn id="14" presetID="2" presetClass="exit" presetSubtype="8" fill="hold" grpId="0" nodeType="withEffect">
-                                  <p:stCondLst>
-                                    <p:cond delay="0"/>
-                                  </p:stCondLst>
-                                  <p:childTnLst>
-                                    <p:anim calcmode="lin" valueType="num">
-                                      <p:cBhvr additive="base">
-                                        <p:cTn id="15" dur="500"/>
-                                        <p:tgtEl>
-                                          <p:spTgt spid="124"/>
-                                        </p:tgtEl>
-                                        <p:attrNameLst>
-                                          <p:attrName>ppt_x</p:attrName>
-                                        </p:attrNameLst>
-                                      </p:cBhvr>
-                                      <p:tavLst>
-                                        <p:tav tm="0">
-                                          <p:val>
-                                            <p:strVal val="ppt_x"/>
-                                          </p:val>
-                                        </p:tav>
-                                        <p:tav tm="100000">
-                                          <p:val>
-                                            <p:strVal val="0-ppt_w/2"/>
-                                          </p:val>
-                                        </p:tav>
-                                      </p:tavLst>
-                                    </p:anim>
-                                    <p:anim calcmode="lin" valueType="num">
-                                      <p:cBhvr additive="base">
-                                        <p:cTn id="16" dur="500"/>
-                                        <p:tgtEl>
-                                          <p:spTgt spid="124"/>
-                                        </p:tgtEl>
-                                        <p:attrNameLst>
-                                          <p:attrName>ppt_y</p:attrName>
-                                        </p:attrNameLst>
-                                      </p:cBhvr>
-                                      <p:tavLst>
-                                        <p:tav tm="0">
-                                          <p:val>
-                                            <p:strVal val="ppt_y"/>
-                                          </p:val>
-                                        </p:tav>
-                                        <p:tav tm="100000">
-                                          <p:val>
-                                            <p:strVal val="ppt_y"/>
-                                          </p:val>
-                                        </p:tav>
-                                      </p:tavLst>
-                                    </p:anim>
-                                    <p:set>
-                                      <p:cBhvr>
-                                        <p:cTn id="17" dur="1" fill="hold">
-                                          <p:stCondLst>
-                                            <p:cond delay="499"/>
-                                          </p:stCondLst>
-                                        </p:cTn>
-                                        <p:tgtEl>
-                                          <p:spTgt spid="124"/>
-                                        </p:tgtEl>
-                                        <p:attrNameLst>
-                                          <p:attrName>style.visibility</p:attrName>
-                                        </p:attrNameLst>
-                                      </p:cBhvr>
-                                      <p:to>
-                                        <p:strVal val="hidden"/>
-                                      </p:to>
-                                    </p:set>
-                                  </p:childTnLst>
-                                </p:cTn>
-                              </p:par>
-                            </p:childTnLst>
-                          </p:cTn>
-                        </p:par>
-                      </p:childTnLst>
-                    </p:cTn>
-                  </p:par>
-                </p:childTnLst>
-              </p:cTn>
-              <p:prevCondLst>
-                <p:cond evt="onPrev" delay="0">
-                  <p:tgtEl>
-                    <p:sldTgt/>
-                  </p:tgtEl>
-                </p:cond>
-              </p:prevCondLst>
-              <p:nextCondLst>
-                <p:cond evt="onNext" delay="0">
-                  <p:tgtEl>
-                    <p:sldTgt/>
-                  </p:tgtEl>
-                </p:cond>
-              </p:nextCondLst>
-            </p:seq>
-          </p:childTnLst>
-        </p:cTn>
+        <p:cTn id="1" dur="indefinite" restart="never" nodeType="tmRoot"/>
       </p:par>
     </p:tnLst>
-    <p:bldLst>
-      <p:bldP spid="124" grpId="0"/>
-    </p:bldLst>
   </p:timing>
 </p:sld>
 </file>
@@ -17723,7 +17345,7 @@
           <a:p>
             <a:fld id="{8838DC5F-BE50-418E-B541-A41F452E432A}" type="datetime1">
               <a:rPr lang="en-US" smtClean="0"/>
-              <a:t>3/14/2018</a:t>
+              <a:t>3/21/2018</a:t>
             </a:fld>
             <a:endParaRPr lang="de-DE" dirty="0"/>
           </a:p>
@@ -17861,7 +17483,7 @@
           <a:p>
             <a:fld id="{8838DC5F-BE50-418E-B541-A41F452E432A}" type="datetime1">
               <a:rPr lang="en-US" smtClean="0"/>
-              <a:t>3/14/2018</a:t>
+              <a:t>3/21/2018</a:t>
             </a:fld>
             <a:endParaRPr lang="de-DE" dirty="0"/>
           </a:p>
@@ -18875,7 +18497,7 @@
           <a:p>
             <a:fld id="{8838DC5F-BE50-418E-B541-A41F452E432A}" type="datetime1">
               <a:rPr lang="en-US" smtClean="0"/>
-              <a:t>3/14/2018</a:t>
+              <a:t>3/21/2018</a:t>
             </a:fld>
             <a:endParaRPr lang="de-DE" dirty="0"/>
           </a:p>
@@ -19265,13 +18887,8 @@
               </a:pPr>
               <a:r>
                 <a:rPr lang="en-US" sz="2000" dirty="0" smtClean="0"/>
-                <a:t>Azure </a:t>
+                <a:t>Azure Key Vault</a:t>
               </a:r>
-              <a:r>
-                <a:rPr lang="en-US" sz="2000" dirty="0" smtClean="0"/>
-                <a:t>Key Vault</a:t>
-              </a:r>
-              <a:endParaRPr lang="en-US" sz="2000" dirty="0" smtClean="0"/>
             </a:p>
           </p:txBody>
         </p:sp>
@@ -19410,7 +19027,6 @@
               <a:rPr lang="en-US" sz="2000" dirty="0" smtClean="0"/>
               <a:t>Authenticate</a:t>
             </a:r>
-            <a:endParaRPr lang="en-US" sz="2000" dirty="0" smtClean="0"/>
           </a:p>
         </p:txBody>
       </p:sp>
@@ -19449,7 +19065,6 @@
               <a:rPr lang="en-US" sz="2000" dirty="0" smtClean="0"/>
               <a:t>Access</a:t>
             </a:r>
-            <a:endParaRPr lang="en-US" sz="2000" dirty="0" smtClean="0"/>
           </a:p>
         </p:txBody>
       </p:sp>
@@ -19508,7 +19123,6 @@
               <a:rPr lang="en-US" sz="2000" dirty="0" smtClean="0"/>
               <a:t>Access Policies</a:t>
             </a:r>
-            <a:endParaRPr lang="en-US" sz="2000" dirty="0" smtClean="0"/>
           </a:p>
         </p:txBody>
       </p:sp>
@@ -19566,7 +19180,7 @@
           <a:p>
             <a:fld id="{8838DC5F-BE50-418E-B541-A41F452E432A}" type="datetime1">
               <a:rPr lang="en-US" smtClean="0"/>
-              <a:t>3/14/2018</a:t>
+              <a:t>3/21/2018</a:t>
             </a:fld>
             <a:endParaRPr lang="de-DE" dirty="0"/>
           </a:p>
@@ -19609,9 +19223,9 @@
         <p:grpSpPr>
           <a:xfrm>
             <a:off x="363752" y="2039891"/>
-            <a:ext cx="5247081" cy="1640000"/>
+            <a:ext cx="5302204" cy="1640000"/>
             <a:chOff x="819150" y="1581150"/>
-            <a:chExt cx="5353050" cy="1933575"/>
+            <a:chExt cx="5409286" cy="1933575"/>
           </a:xfrm>
         </p:grpSpPr>
         <p:sp>
@@ -19672,7 +19286,7 @@
           <p:spPr>
             <a:xfrm>
               <a:off x="941262" y="1775691"/>
-              <a:ext cx="5097549" cy="1292662"/>
+              <a:ext cx="5287174" cy="1524060"/>
             </a:xfrm>
             <a:prstGeom prst="rect">
               <a:avLst/>
@@ -19919,16 +19533,32 @@
                   </a:solidFill>
                   <a:latin typeface="Consolas" panose="020B0609020204030204" pitchFamily="49" charset="0"/>
                 </a:rPr>
-                <a:t>="</a:t>
+                <a:t>=“</a:t>
               </a:r>
               <a:r>
-                <a:rPr lang="en-US" sz="1200" dirty="0" err="1" smtClean="0">
+                <a:rPr lang="en-US" sz="1200" b="1" i="1" smtClean="0">
+                  <a:solidFill>
+                    <a:srgbClr val="FF0000"/>
+                  </a:solidFill>
+                  <a:effectLst>
+                    <a:outerShdw blurRad="38100" dist="38100" dir="2700000" algn="tl">
+                      <a:srgbClr val="000000">
+                        <a:alpha val="43137"/>
+                      </a:srgbClr>
+                    </a:outerShdw>
+                  </a:effectLst>
+                  <a:latin typeface="Consolas" panose="020B0609020204030204" pitchFamily="49" charset="0"/>
+                </a:rPr>
+                <a:t>clientsecret</a:t>
+              </a:r>
+              <a:r>
+                <a:rPr lang="en-US" sz="1200" smtClean="0">
                   <a:solidFill>
                     <a:schemeClr val="accent1"/>
                   </a:solidFill>
                   <a:latin typeface="Consolas" panose="020B0609020204030204" pitchFamily="49" charset="0"/>
                 </a:rPr>
-                <a:t>supersecret</a:t>
+                <a:t>" </a:t>
               </a:r>
               <a:r>
                 <a:rPr lang="en-US" sz="1200" dirty="0" smtClean="0">
@@ -19937,7 +19567,7 @@
                   </a:solidFill>
                   <a:latin typeface="Consolas" panose="020B0609020204030204" pitchFamily="49" charset="0"/>
                 </a:rPr>
-                <a:t>" /&gt;</a:t>
+                <a:t>/&gt;</a:t>
               </a:r>
             </a:p>
             <a:p>
@@ -20448,13 +20078,8 @@
                 </a:pPr>
                 <a:r>
                   <a:rPr lang="en-US" sz="2000" dirty="0" smtClean="0"/>
-                  <a:t>Azure </a:t>
+                  <a:t>Azure Key Vault</a:t>
                 </a:r>
-                <a:r>
-                  <a:rPr lang="en-US" sz="2000" dirty="0" smtClean="0"/>
-                  <a:t>Key Vault</a:t>
-                </a:r>
-                <a:endParaRPr lang="en-US" sz="2000" dirty="0" smtClean="0"/>
               </a:p>
             </p:txBody>
           </p:sp>
@@ -20593,7 +20218,6 @@
                 <a:rPr lang="en-US" sz="2000" dirty="0" smtClean="0"/>
                 <a:t>Authenticate</a:t>
               </a:r>
-              <a:endParaRPr lang="en-US" sz="2000" dirty="0" smtClean="0"/>
             </a:p>
           </p:txBody>
         </p:sp>
@@ -20632,7 +20256,6 @@
                 <a:rPr lang="en-US" sz="2000" dirty="0" smtClean="0"/>
                 <a:t>Access</a:t>
               </a:r>
-              <a:endParaRPr lang="en-US" sz="2000" dirty="0" smtClean="0"/>
             </a:p>
           </p:txBody>
         </p:sp>
@@ -20744,59 +20367,6 @@
               <a:rPr lang="en-US" sz="2000" dirty="0" smtClean="0"/>
               <a:t>Deploy</a:t>
             </a:r>
-            <a:endParaRPr lang="en-US" sz="2000" dirty="0" smtClean="0"/>
-          </a:p>
-        </p:txBody>
-      </p:sp>
-      <p:sp>
-        <p:nvSpPr>
-          <p:cNvPr id="53" name="&quot;No&quot; Symbol 52"/>
-          <p:cNvSpPr/>
-          <p:nvPr/>
-        </p:nvSpPr>
-        <p:spPr>
-          <a:xfrm>
-            <a:off x="2949370" y="1943471"/>
-            <a:ext cx="1765339" cy="1765980"/>
-          </a:xfrm>
-          <a:prstGeom prst="noSmoking">
-            <a:avLst/>
-          </a:prstGeom>
-          <a:ln>
-            <a:noFill/>
-          </a:ln>
-        </p:spPr>
-        <p:style>
-          <a:lnRef idx="2">
-            <a:schemeClr val="accent1">
-              <a:shade val="50000"/>
-            </a:schemeClr>
-          </a:lnRef>
-          <a:fillRef idx="1">
-            <a:schemeClr val="accent1"/>
-          </a:fillRef>
-          <a:effectRef idx="0">
-            <a:schemeClr val="accent1"/>
-          </a:effectRef>
-          <a:fontRef idx="minor">
-            <a:schemeClr val="lt1"/>
-          </a:fontRef>
-        </p:style>
-        <p:txBody>
-          <a:bodyPr rot="0" spcFirstLastPara="0" vertOverflow="overflow" horzOverflow="overflow" vert="horz" wrap="square" lIns="144000" tIns="144000" rIns="144000" bIns="144000" numCol="1" spcCol="0" rtlCol="0" fromWordArt="0" anchor="ctr" anchorCtr="0" forceAA="0" compatLnSpc="1">
-            <a:prstTxWarp prst="textNoShape">
-              <a:avLst/>
-            </a:prstTxWarp>
-            <a:noAutofit/>
-          </a:bodyPr>
-          <a:lstStyle/>
-          <a:p>
-            <a:pPr algn="ctr"/>
-            <a:endParaRPr lang="en-US" sz="2000" dirty="0" err="1" smtClean="0">
-              <a:solidFill>
-                <a:schemeClr val="tx1"/>
-              </a:solidFill>
-            </a:endParaRPr>
           </a:p>
         </p:txBody>
       </p:sp>
@@ -20813,80 +20383,9 @@
   <p:timing>
     <p:tnLst>
       <p:par>
-        <p:cTn id="1" dur="indefinite" restart="never" nodeType="tmRoot">
-          <p:childTnLst>
-            <p:seq concurrent="1" nextAc="seek">
-              <p:cTn id="2" dur="indefinite" nodeType="mainSeq">
-                <p:childTnLst>
-                  <p:par>
-                    <p:cTn id="3" fill="hold">
-                      <p:stCondLst>
-                        <p:cond delay="indefinite"/>
-                      </p:stCondLst>
-                      <p:childTnLst>
-                        <p:par>
-                          <p:cTn id="4" fill="hold">
-                            <p:stCondLst>
-                              <p:cond delay="0"/>
-                            </p:stCondLst>
-                            <p:childTnLst>
-                              <p:par>
-                                <p:cTn id="5" presetID="1" presetClass="entr" presetSubtype="0" fill="hold" grpId="0" nodeType="clickEffect">
-                                  <p:stCondLst>
-                                    <p:cond delay="0"/>
-                                  </p:stCondLst>
-                                  <p:childTnLst>
-                                    <p:set>
-                                      <p:cBhvr>
-                                        <p:cTn id="6" dur="1" fill="hold">
-                                          <p:stCondLst>
-                                            <p:cond delay="0"/>
-                                          </p:stCondLst>
-                                        </p:cTn>
-                                        <p:tgtEl>
-                                          <p:spTgt spid="53"/>
-                                        </p:tgtEl>
-                                        <p:attrNameLst>
-                                          <p:attrName>style.visibility</p:attrName>
-                                        </p:attrNameLst>
-                                      </p:cBhvr>
-                                      <p:to>
-                                        <p:strVal val="visible"/>
-                                      </p:to>
-                                    </p:set>
-                                  </p:childTnLst>
-                                </p:cTn>
-                              </p:par>
-                            </p:childTnLst>
-                          </p:cTn>
-                        </p:par>
-                      </p:childTnLst>
-                    </p:cTn>
-                  </p:par>
-                </p:childTnLst>
-              </p:cTn>
-              <p:prevCondLst>
-                <p:cond evt="onPrev" delay="0">
-                  <p:tgtEl>
-                    <p:sldTgt/>
-                  </p:tgtEl>
-                </p:cond>
-              </p:prevCondLst>
-              <p:nextCondLst>
-                <p:cond evt="onNext" delay="0">
-                  <p:tgtEl>
-                    <p:sldTgt/>
-                  </p:tgtEl>
-                </p:cond>
-              </p:nextCondLst>
-            </p:seq>
-          </p:childTnLst>
-        </p:cTn>
+        <p:cTn id="1" dur="indefinite" restart="never" nodeType="tmRoot"/>
       </p:par>
     </p:tnLst>
-    <p:bldLst>
-      <p:bldP spid="53" grpId="0" animBg="1"/>
-    </p:bldLst>
   </p:timing>
 </p:sld>
 </file>
@@ -20925,7 +20424,7 @@
           <a:p>
             <a:fld id="{8838DC5F-BE50-418E-B541-A41F452E432A}" type="datetime1">
               <a:rPr lang="en-US" smtClean="0"/>
-              <a:t>3/14/2018</a:t>
+              <a:t>3/21/2018</a:t>
             </a:fld>
             <a:endParaRPr lang="de-DE" dirty="0"/>
           </a:p>
@@ -21418,13 +20917,8 @@
                 </a:pPr>
                 <a:r>
                   <a:rPr lang="en-US" sz="2000" dirty="0" smtClean="0"/>
-                  <a:t>Azure </a:t>
+                  <a:t>Azure Key Vault</a:t>
                 </a:r>
-                <a:r>
-                  <a:rPr lang="en-US" sz="2000" dirty="0" smtClean="0"/>
-                  <a:t>Key Vault</a:t>
-                </a:r>
-                <a:endParaRPr lang="en-US" sz="2000" dirty="0" smtClean="0"/>
               </a:p>
             </p:txBody>
           </p:sp>
@@ -21563,7 +21057,6 @@
                 <a:rPr lang="en-US" sz="2000" dirty="0" smtClean="0"/>
                 <a:t>Authenticate</a:t>
               </a:r>
-              <a:endParaRPr lang="en-US" sz="2000" dirty="0" smtClean="0"/>
             </a:p>
           </p:txBody>
         </p:sp>
@@ -21602,7 +21095,6 @@
                 <a:rPr lang="en-US" sz="2000" dirty="0" smtClean="0"/>
                 <a:t>Access</a:t>
               </a:r>
-              <a:endParaRPr lang="en-US" sz="2000" dirty="0" smtClean="0"/>
             </a:p>
           </p:txBody>
         </p:sp>
@@ -21655,7 +21147,6 @@
               <a:rPr lang="en-US" sz="2000" dirty="0" smtClean="0"/>
               <a:t>Certificate Store</a:t>
             </a:r>
-            <a:endParaRPr lang="en-US" sz="2000" dirty="0" smtClean="0"/>
           </a:p>
         </p:txBody>
       </p:sp>
@@ -21727,7 +21218,6 @@
               <a:rPr lang="en-US" sz="2000" dirty="0" smtClean="0"/>
               <a:t>Deploy</a:t>
             </a:r>
-            <a:endParaRPr lang="en-US" sz="2000" dirty="0" smtClean="0"/>
           </a:p>
         </p:txBody>
       </p:sp>
@@ -21740,9 +21230,9 @@
         <p:grpSpPr>
           <a:xfrm>
             <a:off x="431790" y="1591629"/>
-            <a:ext cx="6183527" cy="1640000"/>
+            <a:ext cx="6065329" cy="1640000"/>
             <a:chOff x="819150" y="1581150"/>
-            <a:chExt cx="5929338" cy="1933575"/>
+            <a:chExt cx="5815999" cy="1933575"/>
           </a:xfrm>
         </p:grpSpPr>
         <p:sp>
@@ -21803,7 +21293,7 @@
           <p:spPr>
             <a:xfrm>
               <a:off x="941262" y="1775691"/>
-              <a:ext cx="5807226" cy="1524060"/>
+              <a:ext cx="5458270" cy="1524060"/>
             </a:xfrm>
             <a:prstGeom prst="rect">
               <a:avLst/>
@@ -22062,9 +21552,9 @@
                 <a:t>"</a:t>
               </a:r>
               <a:r>
-                <a:rPr lang="en-US" sz="1200" dirty="0" err="1" smtClean="0">
+                <a:rPr lang="en-US" sz="1200" b="1" i="1" dirty="0" err="1" smtClean="0">
                   <a:solidFill>
-                    <a:schemeClr val="accent1"/>
+                    <a:srgbClr val="FF0000"/>
                   </a:solidFill>
                   <a:latin typeface="Consolas" panose="020B0609020204030204" pitchFamily="49" charset="0"/>
                 </a:rPr>
@@ -22181,118 +21671,7 @@
   <p:timing>
     <p:tnLst>
       <p:par>
-        <p:cTn id="1" dur="indefinite" restart="never" nodeType="tmRoot">
-          <p:childTnLst>
-            <p:seq concurrent="1" nextAc="seek">
-              <p:cTn id="2" dur="indefinite" nodeType="mainSeq">
-                <p:childTnLst>
-                  <p:par>
-                    <p:cTn id="3" fill="hold">
-                      <p:stCondLst>
-                        <p:cond delay="indefinite"/>
-                      </p:stCondLst>
-                      <p:childTnLst>
-                        <p:par>
-                          <p:cTn id="4" fill="hold">
-                            <p:stCondLst>
-                              <p:cond delay="0"/>
-                            </p:stCondLst>
-                            <p:childTnLst>
-                              <p:par>
-                                <p:cTn id="5" presetID="10" presetClass="entr" presetSubtype="0" fill="hold" nodeType="clickEffect">
-                                  <p:stCondLst>
-                                    <p:cond delay="0"/>
-                                  </p:stCondLst>
-                                  <p:childTnLst>
-                                    <p:set>
-                                      <p:cBhvr>
-                                        <p:cTn id="6" dur="1" fill="hold">
-                                          <p:stCondLst>
-                                            <p:cond delay="0"/>
-                                          </p:stCondLst>
-                                        </p:cTn>
-                                        <p:tgtEl>
-                                          <p:spTgt spid="72"/>
-                                        </p:tgtEl>
-                                        <p:attrNameLst>
-                                          <p:attrName>style.visibility</p:attrName>
-                                        </p:attrNameLst>
-                                      </p:cBhvr>
-                                      <p:to>
-                                        <p:strVal val="visible"/>
-                                      </p:to>
-                                    </p:set>
-                                    <p:animEffect transition="in" filter="fade">
-                                      <p:cBhvr>
-                                        <p:cTn id="7" dur="500"/>
-                                        <p:tgtEl>
-                                          <p:spTgt spid="72"/>
-                                        </p:tgtEl>
-                                      </p:cBhvr>
-                                    </p:animEffect>
-                                  </p:childTnLst>
-                                </p:cTn>
-                              </p:par>
-                              <p:par>
-                                <p:cTn id="8" presetID="10" presetClass="entr" presetSubtype="0" fill="hold" nodeType="withEffect">
-                                  <p:stCondLst>
-                                    <p:cond delay="0"/>
-                                  </p:stCondLst>
-                                  <p:childTnLst>
-                                    <p:set>
-                                      <p:cBhvr>
-                                        <p:cTn id="9" dur="1" fill="hold">
-                                          <p:stCondLst>
-                                            <p:cond delay="0"/>
-                                          </p:stCondLst>
-                                        </p:cTn>
-                                        <p:tgtEl>
-                                          <p:spTgt spid="68"/>
-                                        </p:tgtEl>
-                                        <p:attrNameLst>
-                                          <p:attrName>style.visibility</p:attrName>
-                                        </p:attrNameLst>
-                                      </p:cBhvr>
-                                      <p:to>
-                                        <p:strVal val="visible"/>
-                                      </p:to>
-                                    </p:set>
-                                    <p:animEffect transition="in" filter="fade">
-                                      <p:cBhvr>
-                                        <p:cTn id="10" dur="500"/>
-                                        <p:tgtEl>
-                                          <p:spTgt spid="68"/>
-                                        </p:tgtEl>
-                                      </p:cBhvr>
-                                    </p:animEffect>
-                                  </p:childTnLst>
-                                </p:cTn>
-                              </p:par>
-                            </p:childTnLst>
-                          </p:cTn>
-                        </p:par>
-                      </p:childTnLst>
-                    </p:cTn>
-                  </p:par>
-                </p:childTnLst>
-              </p:cTn>
-              <p:prevCondLst>
-                <p:cond evt="onPrev" delay="0">
-                  <p:tgtEl>
-                    <p:sldTgt/>
-                  </p:tgtEl>
-                </p:cond>
-              </p:prevCondLst>
-              <p:nextCondLst>
-                <p:cond evt="onNext" delay="0">
-                  <p:tgtEl>
-                    <p:sldTgt/>
-                  </p:tgtEl>
-                </p:cond>
-              </p:nextCondLst>
-            </p:seq>
-          </p:childTnLst>
-        </p:cTn>
+        <p:cTn id="1" dur="indefinite" restart="never" nodeType="tmRoot"/>
       </p:par>
     </p:tnLst>
   </p:timing>
@@ -23308,23 +22687,6 @@
 </file>
 
 <file path=customXml/item1.xml><?xml version="1.0" encoding="utf-8"?>
-<p:properties xmlns:p="http://schemas.microsoft.com/office/2006/metadata/properties" xmlns:xsi="http://www.w3.org/2001/XMLSchema-instance" xmlns:pc="http://schemas.microsoft.com/office/infopath/2007/PartnerControls">
-  <documentManagement>
-    <Sprache xmlns="650fe5fa-9f8b-4846-863b-3ca82cc20eb5">DE/EN</Sprache>
-    <b1d66cc663ca419ba515713d76b6cf38 xmlns="7d68e36e-b8cb-4be9-9a4f-9fa8c8c046f6">
-      <Terms xmlns="http://schemas.microsoft.com/office/infopath/2007/PartnerControls"/>
-    </b1d66cc663ca419ba515713d76b6cf38>
-    <TaxCatchAll xmlns="4b31ebbf-8119-4e58-b3a0-8e0bca362ee0"/>
-    <_dlc_DocId xmlns="8f79deaa-06da-4ea5-81d9-d212cbe0391d">ASYIPO-6-130</_dlc_DocId>
-    <_dlc_DocIdUrl xmlns="8f79deaa-06da-4ea5-81d9-d212cbe0391d">
-      <Url>https://insight.arvato-systems.de/functions/marketing/_layouts/15/DocIdRedir.aspx?ID=ASYIPO-6-130</Url>
-      <Description>ASYIPO-6-130</Description>
-    </_dlc_DocIdUrl>
-  </documentManagement>
-</p:properties>
-</file>
-
-<file path=customXml/item2.xml><?xml version="1.0" encoding="utf-8"?>
 <?mso-contentType ?>
 <spe:Receivers xmlns:spe="http://schemas.microsoft.com/sharepoint/events">
   <Receiver>
@@ -23370,7 +22732,38 @@
 </spe:Receivers>
 </file>
 
+<file path=customXml/item2.xml><?xml version="1.0" encoding="utf-8"?>
+<p:properties xmlns:p="http://schemas.microsoft.com/office/2006/metadata/properties" xmlns:xsi="http://www.w3.org/2001/XMLSchema-instance" xmlns:pc="http://schemas.microsoft.com/office/infopath/2007/PartnerControls">
+  <documentManagement>
+    <Sprache xmlns="650fe5fa-9f8b-4846-863b-3ca82cc20eb5">DE/EN</Sprache>
+    <b1d66cc663ca419ba515713d76b6cf38 xmlns="7d68e36e-b8cb-4be9-9a4f-9fa8c8c046f6">
+      <Terms xmlns="http://schemas.microsoft.com/office/infopath/2007/PartnerControls"/>
+    </b1d66cc663ca419ba515713d76b6cf38>
+    <TaxCatchAll xmlns="4b31ebbf-8119-4e58-b3a0-8e0bca362ee0"/>
+    <_dlc_DocId xmlns="8f79deaa-06da-4ea5-81d9-d212cbe0391d">ASYIPO-6-130</_dlc_DocId>
+    <_dlc_DocIdUrl xmlns="8f79deaa-06da-4ea5-81d9-d212cbe0391d">
+      <Url>https://insight.arvato-systems.de/functions/marketing/_layouts/15/DocIdRedir.aspx?ID=ASYIPO-6-130</Url>
+      <Description>ASYIPO-6-130</Description>
+    </_dlc_DocIdUrl>
+  </documentManagement>
+</p:properties>
+</file>
+
 <file path=customXml/item3.xml><?xml version="1.0" encoding="utf-8"?>
+<?mso-contentType ?>
+<SharedContentType xmlns="Microsoft.SharePoint.Taxonomy.ContentTypeSync" SourceId="3dba7ea3-17ef-4621-80fd-8c5d3927c1b6" ContentTypeId="0x0101" PreviousValue="false"/>
+</file>
+
+<file path=customXml/item4.xml><?xml version="1.0" encoding="utf-8"?>
+<?mso-contentType ?>
+<FormTemplates xmlns="http://schemas.microsoft.com/sharepoint/v3/contenttype/forms">
+  <Display>DocumentLibraryForm</Display>
+  <Edit>DocumentLibraryForm</Edit>
+  <New>DocumentLibraryForm</New>
+</FormTemplates>
+</file>
+
+<file path=customXml/item5.xml><?xml version="1.0" encoding="utf-8"?>
 <ct:contentTypeSchema xmlns:ct="http://schemas.microsoft.com/office/2006/metadata/contentType" xmlns:ma="http://schemas.microsoft.com/office/2006/metadata/properties/metaAttributes" ct:_="" ma:_="" ma:contentTypeName="Document" ma:contentTypeID="0x01010018BADDD33F29A941BD1C60D1347A40E3" ma:contentTypeVersion="9" ma:contentTypeDescription="Create a new document." ma:contentTypeScope="" ma:versionID="71875909508ac63e7fefdc68cedc05f8">
   <xsd:schema xmlns:xsd="http://www.w3.org/2001/XMLSchema" xmlns:xs="http://www.w3.org/2001/XMLSchema" xmlns:p="http://schemas.microsoft.com/office/2006/metadata/properties" xmlns:ns2="650fe5fa-9f8b-4846-863b-3ca82cc20eb5" xmlns:ns3="8f79deaa-06da-4ea5-81d9-d212cbe0391d" xmlns:ns4="7d68e36e-b8cb-4be9-9a4f-9fa8c8c046f6" xmlns:ns5="4b31ebbf-8119-4e58-b3a0-8e0bca362ee0" xmlns:ns6="ab830626-b284-4a7c-b2d6-002654365071" targetNamespace="http://schemas.microsoft.com/office/2006/metadata/properties" ma:root="true" ma:fieldsID="d62a0726b71183b95a3b8c80f6ed9776" ns2:_="" ns3:_="" ns4:_="" ns5:_="" ns6:_="">
     <xsd:import namespace="650fe5fa-9f8b-4846-863b-3ca82cc20eb5"/>
@@ -23585,33 +22978,27 @@
 </ct:contentTypeSchema>
 </file>
 
-<file path=customXml/item4.xml><?xml version="1.0" encoding="utf-8"?>
-<?mso-contentType ?>
-<FormTemplates xmlns="http://schemas.microsoft.com/sharepoint/v3/contenttype/forms">
-  <Display>DocumentLibraryForm</Display>
-  <Edit>DocumentLibraryForm</Edit>
-  <New>DocumentLibraryForm</New>
-</FormTemplates>
+<file path=customXml/itemProps1.xml><?xml version="1.0" encoding="utf-8"?>
+<ds:datastoreItem xmlns:ds="http://schemas.openxmlformats.org/officeDocument/2006/customXml" ds:itemID="{AB9A309D-3B1A-4B97-B07D-69607FF49604}">
+  <ds:schemaRefs>
+    <ds:schemaRef ds:uri="http://schemas.microsoft.com/sharepoint/events"/>
+  </ds:schemaRefs>
+</ds:datastoreItem>
 </file>
 
-<file path=customXml/item5.xml><?xml version="1.0" encoding="utf-8"?>
-<?mso-contentType ?>
-<SharedContentType xmlns="Microsoft.SharePoint.Taxonomy.ContentTypeSync" SourceId="3dba7ea3-17ef-4621-80fd-8c5d3927c1b6" ContentTypeId="0x0101" PreviousValue="false"/>
-</file>
-
-<file path=customXml/itemProps1.xml><?xml version="1.0" encoding="utf-8"?>
+<file path=customXml/itemProps2.xml><?xml version="1.0" encoding="utf-8"?>
 <ds:datastoreItem xmlns:ds="http://schemas.openxmlformats.org/officeDocument/2006/customXml" ds:itemID="{7B6F2769-7194-4217-93D3-3AF3A4742282}">
   <ds:schemaRefs>
-    <ds:schemaRef ds:uri="http://schemas.microsoft.com/office/2006/metadata/properties"/>
-    <ds:schemaRef ds:uri="7d68e36e-b8cb-4be9-9a4f-9fa8c8c046f6"/>
     <ds:schemaRef ds:uri="650fe5fa-9f8b-4846-863b-3ca82cc20eb5"/>
     <ds:schemaRef ds:uri="http://purl.org/dc/terms/"/>
     <ds:schemaRef ds:uri="4b31ebbf-8119-4e58-b3a0-8e0bca362ee0"/>
     <ds:schemaRef ds:uri="http://schemas.microsoft.com/office/2006/documentManagement/types"/>
     <ds:schemaRef ds:uri="ab830626-b284-4a7c-b2d6-002654365071"/>
     <ds:schemaRef ds:uri="8f79deaa-06da-4ea5-81d9-d212cbe0391d"/>
+    <ds:schemaRef ds:uri="http://purl.org/dc/elements/1.1/"/>
+    <ds:schemaRef ds:uri="http://schemas.microsoft.com/office/2006/metadata/properties"/>
+    <ds:schemaRef ds:uri="7d68e36e-b8cb-4be9-9a4f-9fa8c8c046f6"/>
     <ds:schemaRef ds:uri="http://schemas.microsoft.com/office/infopath/2007/PartnerControls"/>
-    <ds:schemaRef ds:uri="http://purl.org/dc/elements/1.1/"/>
     <ds:schemaRef ds:uri="http://schemas.openxmlformats.org/package/2006/metadata/core-properties"/>
     <ds:schemaRef ds:uri="http://www.w3.org/XML/1998/namespace"/>
     <ds:schemaRef ds:uri="http://purl.org/dc/dcmitype/"/>
@@ -23619,15 +23006,23 @@
 </ds:datastoreItem>
 </file>
 
-<file path=customXml/itemProps2.xml><?xml version="1.0" encoding="utf-8"?>
-<ds:datastoreItem xmlns:ds="http://schemas.openxmlformats.org/officeDocument/2006/customXml" ds:itemID="{AB9A309D-3B1A-4B97-B07D-69607FF49604}">
+<file path=customXml/itemProps3.xml><?xml version="1.0" encoding="utf-8"?>
+<ds:datastoreItem xmlns:ds="http://schemas.openxmlformats.org/officeDocument/2006/customXml" ds:itemID="{D707FBF6-E278-432A-A4F7-3A60011E3B2A}">
   <ds:schemaRefs>
-    <ds:schemaRef ds:uri="http://schemas.microsoft.com/sharepoint/events"/>
+    <ds:schemaRef ds:uri="Microsoft.SharePoint.Taxonomy.ContentTypeSync"/>
   </ds:schemaRefs>
 </ds:datastoreItem>
 </file>
 
-<file path=customXml/itemProps3.xml><?xml version="1.0" encoding="utf-8"?>
+<file path=customXml/itemProps4.xml><?xml version="1.0" encoding="utf-8"?>
+<ds:datastoreItem xmlns:ds="http://schemas.openxmlformats.org/officeDocument/2006/customXml" ds:itemID="{87D2A1B0-FF3E-4009-940D-AED0EB70AA20}">
+  <ds:schemaRefs>
+    <ds:schemaRef ds:uri="http://schemas.microsoft.com/sharepoint/v3/contenttype/forms"/>
+  </ds:schemaRefs>
+</ds:datastoreItem>
+</file>
+
+<file path=customXml/itemProps5.xml><?xml version="1.0" encoding="utf-8"?>
 <ds:datastoreItem xmlns:ds="http://schemas.openxmlformats.org/officeDocument/2006/customXml" ds:itemID="{55AE02DB-5A51-480A-B674-6C4CE3A79491}">
   <ds:schemaRefs>
     <ds:schemaRef ds:uri="http://schemas.microsoft.com/office/2006/metadata/contentType"/>
@@ -23647,20 +23042,4 @@
     <ds:schemaRef ds:uri="http://schemas.microsoft.com/internal/obd"/>
   </ds:schemaRefs>
 </ds:datastoreItem>
-</file>
-
-<file path=customXml/itemProps4.xml><?xml version="1.0" encoding="utf-8"?>
-<ds:datastoreItem xmlns:ds="http://schemas.openxmlformats.org/officeDocument/2006/customXml" ds:itemID="{87D2A1B0-FF3E-4009-940D-AED0EB70AA20}">
-  <ds:schemaRefs>
-    <ds:schemaRef ds:uri="http://schemas.microsoft.com/sharepoint/v3/contenttype/forms"/>
-  </ds:schemaRefs>
-</ds:datastoreItem>
-</file>
-
-<file path=customXml/itemProps5.xml><?xml version="1.0" encoding="utf-8"?>
-<ds:datastoreItem xmlns:ds="http://schemas.openxmlformats.org/officeDocument/2006/customXml" ds:itemID="{D707FBF6-E278-432A-A4F7-3A60011E3B2A}">
-  <ds:schemaRefs>
-    <ds:schemaRef ds:uri="Microsoft.SharePoint.Taxonomy.ContentTypeSync"/>
-  </ds:schemaRefs>
-</ds:datastoreItem>
 </file>
</xml_diff>

<commit_message>
Small updates to the presentation.
</commit_message>
<xml_diff>
--- a/Securely Access Secrets within Azure Key Vault.pptx
+++ b/Securely Access Secrets within Azure Key Vault.pptx
@@ -19536,7 +19536,7 @@
                 <a:t>=“</a:t>
               </a:r>
               <a:r>
-                <a:rPr lang="en-US" sz="1200" b="1" i="1" smtClean="0">
+                <a:rPr lang="en-US" sz="1200" b="1" i="1" dirty="0" err="1" smtClean="0">
                   <a:solidFill>
                     <a:srgbClr val="FF0000"/>
                   </a:solidFill>
@@ -19552,7 +19552,7 @@
                 <a:t>clientsecret</a:t>
               </a:r>
               <a:r>
-                <a:rPr lang="en-US" sz="1200" smtClean="0">
+                <a:rPr lang="en-US" sz="1200" dirty="0" smtClean="0">
                   <a:solidFill>
                     <a:schemeClr val="accent1"/>
                   </a:solidFill>

</xml_diff>